<commit_message>
weighted perfect matching and dcs
</commit_message>
<xml_diff>
--- a/graphAlgorithms/vmatch/figs.pptx
+++ b/graphAlgorithms/vmatch/figs.pptx
@@ -6,14 +6,15 @@
     <p:sldMasterId id="2147483651" r:id="rId2"/>
   </p:sldMasterIdLst>
   <p:notesMasterIdLst>
-    <p:notesMasterId r:id="rId5"/>
+    <p:notesMasterId r:id="rId6"/>
   </p:notesMasterIdLst>
   <p:handoutMasterIdLst>
-    <p:handoutMasterId r:id="rId6"/>
+    <p:handoutMasterId r:id="rId7"/>
   </p:handoutMasterIdLst>
   <p:sldIdLst>
     <p:sldId id="729" r:id="rId3"/>
     <p:sldId id="746" r:id="rId4"/>
+    <p:sldId id="753" r:id="rId5"/>
   </p:sldIdLst>
   <p:sldSz cx="9144000" cy="6858000" type="letter"/>
   <p:notesSz cx="6858000" cy="8686800"/>
@@ -1050,6 +1051,98 @@
     <p:extLst>
       <p:ext uri="{BB962C8B-B14F-4D97-AF65-F5344CB8AC3E}">
         <p14:creationId xmlns:p14="http://schemas.microsoft.com/office/powerpoint/2010/main" val="1023754878"/>
+      </p:ext>
+    </p:extLst>
+  </p:cSld>
+  <p:clrMapOvr>
+    <a:masterClrMapping/>
+  </p:clrMapOvr>
+</p:notes>
+</file>
+
+<file path=ppt/notesSlides/notesSlide3.xml><?xml version="1.0" encoding="utf-8"?>
+<p:notes xmlns:a="http://schemas.openxmlformats.org/drawingml/2006/main" xmlns:r="http://schemas.openxmlformats.org/officeDocument/2006/relationships" xmlns:p="http://schemas.openxmlformats.org/presentationml/2006/main">
+  <p:cSld>
+    <p:spTree>
+      <p:nvGrpSpPr>
+        <p:cNvPr id="1" name=""/>
+        <p:cNvGrpSpPr/>
+        <p:nvPr/>
+      </p:nvGrpSpPr>
+      <p:grpSpPr>
+        <a:xfrm>
+          <a:off x="0" y="0"/>
+          <a:ext cx="0" cy="0"/>
+          <a:chOff x="0" y="0"/>
+          <a:chExt cx="0" cy="0"/>
+        </a:xfrm>
+      </p:grpSpPr>
+      <p:sp>
+        <p:nvSpPr>
+          <p:cNvPr id="2" name="Slide Image Placeholder 1"/>
+          <p:cNvSpPr>
+            <a:spLocks noGrp="1" noRot="1" noChangeAspect="1"/>
+          </p:cNvSpPr>
+          <p:nvPr>
+            <p:ph type="sldImg"/>
+          </p:nvPr>
+        </p:nvSpPr>
+        <p:spPr/>
+      </p:sp>
+      <p:sp>
+        <p:nvSpPr>
+          <p:cNvPr id="3" name="Notes Placeholder 2"/>
+          <p:cNvSpPr>
+            <a:spLocks noGrp="1"/>
+          </p:cNvSpPr>
+          <p:nvPr>
+            <p:ph type="body" idx="1"/>
+          </p:nvPr>
+        </p:nvSpPr>
+        <p:spPr/>
+        <p:txBody>
+          <a:bodyPr>
+            <a:normAutofit/>
+          </a:bodyPr>
+          <a:lstStyle/>
+          <a:p>
+            <a:endParaRPr lang="en-US" dirty="0"/>
+          </a:p>
+        </p:txBody>
+      </p:sp>
+      <p:sp>
+        <p:nvSpPr>
+          <p:cNvPr id="4" name="Slide Number Placeholder 3"/>
+          <p:cNvSpPr>
+            <a:spLocks noGrp="1"/>
+          </p:cNvSpPr>
+          <p:nvPr>
+            <p:ph type="sldNum" sz="quarter" idx="10"/>
+          </p:nvPr>
+        </p:nvSpPr>
+        <p:spPr/>
+        <p:txBody>
+          <a:bodyPr/>
+          <a:lstStyle/>
+          <a:p>
+            <a:pPr>
+              <a:defRPr/>
+            </a:pPr>
+            <a:fld id="{53FC361A-BD9F-4A25-BAFF-443257819830}" type="slidenum">
+              <a:rPr lang="en-US" smtClean="0"/>
+              <a:pPr>
+                <a:defRPr/>
+              </a:pPr>
+              <a:t>3</a:t>
+            </a:fld>
+            <a:endParaRPr lang="en-US"/>
+          </a:p>
+        </p:txBody>
+      </p:sp>
+    </p:spTree>
+    <p:extLst>
+      <p:ext uri="{BB962C8B-B14F-4D97-AF65-F5344CB8AC3E}">
+        <p14:creationId xmlns:p14="http://schemas.microsoft.com/office/powerpoint/2010/main" val="2448912045"/>
       </p:ext>
     </p:extLst>
   </p:cSld>
@@ -17341,6 +17434,2659 @@
     <a:masterClrMapping/>
   </p:clrMapOvr>
   <p:transition/>
+</p:sld>
+</file>
+
+<file path=ppt/slides/slide3.xml><?xml version="1.0" encoding="utf-8"?>
+<p:sld xmlns:a="http://schemas.openxmlformats.org/drawingml/2006/main" xmlns:r="http://schemas.openxmlformats.org/officeDocument/2006/relationships" xmlns:p="http://schemas.openxmlformats.org/presentationml/2006/main" showMasterPhAnim="0">
+  <p:cSld>
+    <p:spTree>
+      <p:nvGrpSpPr>
+        <p:cNvPr id="1" name=""/>
+        <p:cNvGrpSpPr/>
+        <p:nvPr/>
+      </p:nvGrpSpPr>
+      <p:grpSpPr>
+        <a:xfrm>
+          <a:off x="0" y="0"/>
+          <a:ext cx="0" cy="0"/>
+          <a:chOff x="0" y="0"/>
+          <a:chExt cx="0" cy="0"/>
+        </a:xfrm>
+      </p:grpSpPr>
+      <p:sp>
+        <p:nvSpPr>
+          <p:cNvPr id="162" name="TextBox 161">
+            <a:extLst>
+              <a:ext uri="{FF2B5EF4-FFF2-40B4-BE49-F238E27FC236}">
+                <a16:creationId xmlns:a16="http://schemas.microsoft.com/office/drawing/2014/main" id="{57BF2A87-5D01-70DA-4671-26B0826E2BD5}"/>
+              </a:ext>
+            </a:extLst>
+          </p:cNvPr>
+          <p:cNvSpPr txBox="1"/>
+          <p:nvPr/>
+        </p:nvSpPr>
+        <p:spPr>
+          <a:xfrm>
+            <a:off x="702336" y="1131232"/>
+            <a:ext cx="2980496" cy="369332"/>
+          </a:xfrm>
+          <a:prstGeom prst="rect">
+            <a:avLst/>
+          </a:prstGeom>
+          <a:solidFill>
+            <a:schemeClr val="bg1"/>
+          </a:solidFill>
+        </p:spPr>
+        <p:txBody>
+          <a:bodyPr wrap="none" lIns="0" tIns="0" rIns="0" bIns="0" rtlCol="0" anchor="ctr" anchorCtr="1">
+            <a:spAutoFit/>
+          </a:bodyPr>
+          <a:lstStyle/>
+          <a:p>
+            <a:r>
+              <a:rPr lang="en-US" sz="2400">
+                <a:latin typeface="+mn-lt"/>
+              </a:rPr>
+              <a:t>tutteReduction4dcs</a:t>
+            </a:r>
+            <a:endParaRPr lang="en-US" sz="2400" dirty="0">
+              <a:latin typeface="+mn-lt"/>
+            </a:endParaRPr>
+          </a:p>
+        </p:txBody>
+      </p:sp>
+      <p:grpSp>
+        <p:nvGrpSpPr>
+          <p:cNvPr id="185" name="Group 184">
+            <a:extLst>
+              <a:ext uri="{FF2B5EF4-FFF2-40B4-BE49-F238E27FC236}">
+                <a16:creationId xmlns:a16="http://schemas.microsoft.com/office/drawing/2014/main" id="{136659B1-792D-3A96-FD72-6106B516E6E8}"/>
+              </a:ext>
+            </a:extLst>
+          </p:cNvPr>
+          <p:cNvGrpSpPr/>
+          <p:nvPr/>
+        </p:nvGrpSpPr>
+        <p:grpSpPr>
+          <a:xfrm>
+            <a:off x="322693" y="3032664"/>
+            <a:ext cx="8498638" cy="2728569"/>
+            <a:chOff x="322693" y="3032664"/>
+            <a:chExt cx="8498638" cy="2728569"/>
+          </a:xfrm>
+        </p:grpSpPr>
+        <p:grpSp>
+          <p:nvGrpSpPr>
+            <p:cNvPr id="161" name="Group 160">
+              <a:extLst>
+                <a:ext uri="{FF2B5EF4-FFF2-40B4-BE49-F238E27FC236}">
+                  <a16:creationId xmlns:a16="http://schemas.microsoft.com/office/drawing/2014/main" id="{3338591B-36A1-AC61-36AB-321344176DCB}"/>
+                </a:ext>
+              </a:extLst>
+            </p:cNvPr>
+            <p:cNvGrpSpPr/>
+            <p:nvPr/>
+          </p:nvGrpSpPr>
+          <p:grpSpPr>
+            <a:xfrm>
+              <a:off x="322693" y="3032664"/>
+              <a:ext cx="8498638" cy="2728569"/>
+              <a:chOff x="322693" y="3032664"/>
+              <a:chExt cx="8498638" cy="2728569"/>
+            </a:xfrm>
+          </p:grpSpPr>
+          <p:grpSp>
+            <p:nvGrpSpPr>
+              <p:cNvPr id="159" name="Group 158">
+                <a:extLst>
+                  <a:ext uri="{FF2B5EF4-FFF2-40B4-BE49-F238E27FC236}">
+                    <a16:creationId xmlns:a16="http://schemas.microsoft.com/office/drawing/2014/main" id="{A02830F3-F0B5-FC51-3310-9E6790DB3EDB}"/>
+                  </a:ext>
+                </a:extLst>
+              </p:cNvPr>
+              <p:cNvGrpSpPr/>
+              <p:nvPr/>
+            </p:nvGrpSpPr>
+            <p:grpSpPr>
+              <a:xfrm>
+                <a:off x="322693" y="3695253"/>
+                <a:ext cx="3817795" cy="1452278"/>
+                <a:chOff x="322693" y="3695253"/>
+                <a:chExt cx="3817795" cy="1452278"/>
+              </a:xfrm>
+            </p:grpSpPr>
+            <p:sp>
+              <p:nvSpPr>
+                <p:cNvPr id="5" name="Oval 4">
+                  <a:extLst>
+                    <a:ext uri="{FF2B5EF4-FFF2-40B4-BE49-F238E27FC236}">
+                      <a16:creationId xmlns:a16="http://schemas.microsoft.com/office/drawing/2014/main" id="{CAEB3BF8-3EC1-5E2D-E2D2-5D9219450E48}"/>
+                    </a:ext>
+                  </a:extLst>
+                </p:cNvPr>
+                <p:cNvSpPr/>
+                <p:nvPr/>
+              </p:nvSpPr>
+              <p:spPr bwMode="auto">
+                <a:xfrm>
+                  <a:off x="3100529" y="3695253"/>
+                  <a:ext cx="289704" cy="291076"/>
+                </a:xfrm>
+                <a:prstGeom prst="ellipse">
+                  <a:avLst/>
+                </a:prstGeom>
+                <a:solidFill>
+                  <a:srgbClr val="CCFFCC"/>
+                </a:solidFill>
+                <a:ln w="12700" cap="flat" cmpd="sng" algn="ctr">
+                  <a:solidFill>
+                    <a:schemeClr val="tx1"/>
+                  </a:solidFill>
+                  <a:prstDash val="solid"/>
+                  <a:round/>
+                  <a:headEnd type="none" w="sm" len="sm"/>
+                  <a:tailEnd type="none" w="sm" len="sm"/>
+                </a:ln>
+                <a:effectLst/>
+              </p:spPr>
+              <p:txBody>
+                <a:bodyPr vert="horz" wrap="none" lIns="0" tIns="0" rIns="0" bIns="0" numCol="1" rtlCol="0" anchor="ctr" anchorCtr="1" compatLnSpc="1">
+                  <a:prstTxWarp prst="textNoShape">
+                    <a:avLst/>
+                  </a:prstTxWarp>
+                </a:bodyPr>
+                <a:lstStyle/>
+                <a:p>
+                  <a:pPr marL="0" marR="0" indent="0" algn="l" defTabSz="914400" rtl="0" eaLnBrk="0" fontAlgn="base" latinLnBrk="0" hangingPunct="0">
+                    <a:lnSpc>
+                      <a:spcPct val="100000"/>
+                    </a:lnSpc>
+                    <a:spcBef>
+                      <a:spcPct val="0"/>
+                    </a:spcBef>
+                    <a:spcAft>
+                      <a:spcPct val="0"/>
+                    </a:spcAft>
+                    <a:buClrTx/>
+                    <a:buSzTx/>
+                    <a:buFontTx/>
+                    <a:buNone/>
+                    <a:tabLst/>
+                  </a:pPr>
+                  <a:r>
+                    <a:rPr lang="en-US" i="1" dirty="0">
+                      <a:latin typeface="+mn-lt"/>
+                    </a:rPr>
+                    <a:t>e</a:t>
+                  </a:r>
+                  <a:endParaRPr kumimoji="0" lang="en-US" sz="1600" b="0" i="1" u="none" strike="noStrike" cap="none" normalizeH="0" baseline="0" dirty="0">
+                    <a:ln>
+                      <a:noFill/>
+                    </a:ln>
+                    <a:solidFill>
+                      <a:schemeClr val="tx2"/>
+                    </a:solidFill>
+                    <a:effectLst/>
+                    <a:latin typeface="+mn-lt"/>
+                  </a:endParaRPr>
+                </a:p>
+              </p:txBody>
+            </p:sp>
+            <p:sp>
+              <p:nvSpPr>
+                <p:cNvPr id="9" name="Oval 8">
+                  <a:extLst>
+                    <a:ext uri="{FF2B5EF4-FFF2-40B4-BE49-F238E27FC236}">
+                      <a16:creationId xmlns:a16="http://schemas.microsoft.com/office/drawing/2014/main" id="{44E2F6D9-7540-C4F0-3D8B-6588A50A6F98}"/>
+                    </a:ext>
+                  </a:extLst>
+                </p:cNvPr>
+                <p:cNvSpPr/>
+                <p:nvPr/>
+              </p:nvSpPr>
+              <p:spPr bwMode="auto">
+                <a:xfrm>
+                  <a:off x="3850784" y="4856455"/>
+                  <a:ext cx="289704" cy="291076"/>
+                </a:xfrm>
+                <a:prstGeom prst="ellipse">
+                  <a:avLst/>
+                </a:prstGeom>
+                <a:solidFill>
+                  <a:srgbClr val="CCFFCC"/>
+                </a:solidFill>
+                <a:ln w="12700" cap="flat" cmpd="sng" algn="ctr">
+                  <a:solidFill>
+                    <a:schemeClr val="tx1"/>
+                  </a:solidFill>
+                  <a:prstDash val="solid"/>
+                  <a:round/>
+                  <a:headEnd type="none" w="sm" len="sm"/>
+                  <a:tailEnd type="none" w="sm" len="sm"/>
+                </a:ln>
+                <a:effectLst/>
+              </p:spPr>
+              <p:txBody>
+                <a:bodyPr vert="horz" wrap="none" lIns="0" tIns="0" rIns="0" bIns="0" numCol="1" rtlCol="0" anchor="ctr" anchorCtr="1" compatLnSpc="1">
+                  <a:prstTxWarp prst="textNoShape">
+                    <a:avLst/>
+                  </a:prstTxWarp>
+                </a:bodyPr>
+                <a:lstStyle/>
+                <a:p>
+                  <a:pPr marL="0" marR="0" indent="0" algn="l" defTabSz="914400" rtl="0" eaLnBrk="0" fontAlgn="base" latinLnBrk="0" hangingPunct="0">
+                    <a:lnSpc>
+                      <a:spcPct val="100000"/>
+                    </a:lnSpc>
+                    <a:spcBef>
+                      <a:spcPct val="0"/>
+                    </a:spcBef>
+                    <a:spcAft>
+                      <a:spcPct val="0"/>
+                    </a:spcAft>
+                    <a:buClrTx/>
+                    <a:buSzTx/>
+                    <a:buFontTx/>
+                    <a:buNone/>
+                    <a:tabLst/>
+                  </a:pPr>
+                  <a:r>
+                    <a:rPr lang="en-US" i="1" dirty="0">
+                      <a:latin typeface="+mn-lt"/>
+                    </a:rPr>
+                    <a:t>f</a:t>
+                  </a:r>
+                  <a:endParaRPr kumimoji="0" lang="en-US" sz="1600" b="0" i="1" u="none" strike="noStrike" cap="none" normalizeH="0" baseline="0" dirty="0">
+                    <a:ln>
+                      <a:noFill/>
+                    </a:ln>
+                    <a:solidFill>
+                      <a:schemeClr val="tx2"/>
+                    </a:solidFill>
+                    <a:effectLst/>
+                    <a:latin typeface="+mn-lt"/>
+                  </a:endParaRPr>
+                </a:p>
+              </p:txBody>
+            </p:sp>
+            <p:cxnSp>
+              <p:nvCxnSpPr>
+                <p:cNvPr id="13" name="Straight Connector 12">
+                  <a:extLst>
+                    <a:ext uri="{FF2B5EF4-FFF2-40B4-BE49-F238E27FC236}">
+                      <a16:creationId xmlns:a16="http://schemas.microsoft.com/office/drawing/2014/main" id="{498B2D97-7D13-0863-86CD-061254035A12}"/>
+                    </a:ext>
+                  </a:extLst>
+                </p:cNvPr>
+                <p:cNvCxnSpPr>
+                  <a:cxnSpLocks/>
+                  <a:stCxn id="5" idx="5"/>
+                  <a:endCxn id="9" idx="1"/>
+                </p:cNvCxnSpPr>
+                <p:nvPr/>
+              </p:nvCxnSpPr>
+              <p:spPr bwMode="auto">
+                <a:xfrm>
+                  <a:off x="3347807" y="3943702"/>
+                  <a:ext cx="545403" cy="955380"/>
+                </a:xfrm>
+                <a:prstGeom prst="line">
+                  <a:avLst/>
+                </a:prstGeom>
+                <a:solidFill>
+                  <a:schemeClr val="accent1"/>
+                </a:solidFill>
+                <a:ln w="12700" cap="flat" cmpd="sng" algn="ctr">
+                  <a:solidFill>
+                    <a:schemeClr val="tx1"/>
+                  </a:solidFill>
+                  <a:prstDash val="solid"/>
+                  <a:round/>
+                  <a:headEnd type="none" w="sm" len="sm"/>
+                  <a:tailEnd type="none" w="sm" len="sm"/>
+                </a:ln>
+                <a:effectLst/>
+              </p:spPr>
+            </p:cxnSp>
+            <p:cxnSp>
+              <p:nvCxnSpPr>
+                <p:cNvPr id="27" name="Straight Connector 26">
+                  <a:extLst>
+                    <a:ext uri="{FF2B5EF4-FFF2-40B4-BE49-F238E27FC236}">
+                      <a16:creationId xmlns:a16="http://schemas.microsoft.com/office/drawing/2014/main" id="{64372C72-8EB4-1F18-1735-1CB716BCD857}"/>
+                    </a:ext>
+                  </a:extLst>
+                </p:cNvPr>
+                <p:cNvCxnSpPr>
+                  <a:cxnSpLocks/>
+                  <a:stCxn id="35" idx="6"/>
+                  <a:endCxn id="9" idx="2"/>
+                </p:cNvCxnSpPr>
+                <p:nvPr/>
+              </p:nvCxnSpPr>
+              <p:spPr bwMode="auto">
+                <a:xfrm>
+                  <a:off x="2727976" y="5001993"/>
+                  <a:ext cx="1122808" cy="0"/>
+                </a:xfrm>
+                <a:prstGeom prst="line">
+                  <a:avLst/>
+                </a:prstGeom>
+                <a:solidFill>
+                  <a:schemeClr val="accent1"/>
+                </a:solidFill>
+                <a:ln w="12700" cap="flat" cmpd="sng" algn="ctr">
+                  <a:solidFill>
+                    <a:schemeClr val="tx1"/>
+                  </a:solidFill>
+                  <a:prstDash val="solid"/>
+                  <a:round/>
+                  <a:headEnd type="none" w="sm" len="sm"/>
+                  <a:tailEnd type="none" w="sm" len="sm"/>
+                </a:ln>
+                <a:effectLst/>
+              </p:spPr>
+            </p:cxnSp>
+            <p:sp>
+              <p:nvSpPr>
+                <p:cNvPr id="32" name="Oval 31">
+                  <a:extLst>
+                    <a:ext uri="{FF2B5EF4-FFF2-40B4-BE49-F238E27FC236}">
+                      <a16:creationId xmlns:a16="http://schemas.microsoft.com/office/drawing/2014/main" id="{89854030-6E40-2EFC-9811-AC474B696984}"/>
+                    </a:ext>
+                  </a:extLst>
+                </p:cNvPr>
+                <p:cNvSpPr/>
+                <p:nvPr/>
+              </p:nvSpPr>
+              <p:spPr bwMode="auto">
+                <a:xfrm>
+                  <a:off x="322693" y="3706080"/>
+                  <a:ext cx="289704" cy="291076"/>
+                </a:xfrm>
+                <a:prstGeom prst="ellipse">
+                  <a:avLst/>
+                </a:prstGeom>
+                <a:solidFill>
+                  <a:srgbClr val="CCFFCC"/>
+                </a:solidFill>
+                <a:ln w="12700" cap="flat" cmpd="sng" algn="ctr">
+                  <a:solidFill>
+                    <a:schemeClr val="tx1"/>
+                  </a:solidFill>
+                  <a:prstDash val="solid"/>
+                  <a:round/>
+                  <a:headEnd type="none" w="sm" len="sm"/>
+                  <a:tailEnd type="none" w="sm" len="sm"/>
+                </a:ln>
+                <a:effectLst/>
+              </p:spPr>
+              <p:txBody>
+                <a:bodyPr vert="horz" wrap="none" lIns="0" tIns="0" rIns="0" bIns="0" numCol="1" rtlCol="0" anchor="ctr" anchorCtr="1" compatLnSpc="1">
+                  <a:prstTxWarp prst="textNoShape">
+                    <a:avLst/>
+                  </a:prstTxWarp>
+                </a:bodyPr>
+                <a:lstStyle/>
+                <a:p>
+                  <a:pPr marL="0" marR="0" indent="0" algn="l" defTabSz="914400" rtl="0" eaLnBrk="0" fontAlgn="base" latinLnBrk="0" hangingPunct="0">
+                    <a:lnSpc>
+                      <a:spcPct val="100000"/>
+                    </a:lnSpc>
+                    <a:spcBef>
+                      <a:spcPct val="0"/>
+                    </a:spcBef>
+                    <a:spcAft>
+                      <a:spcPct val="0"/>
+                    </a:spcAft>
+                    <a:buClrTx/>
+                    <a:buSzTx/>
+                    <a:buFontTx/>
+                    <a:buNone/>
+                    <a:tabLst/>
+                  </a:pPr>
+                  <a:r>
+                    <a:rPr lang="en-US" i="1" dirty="0">
+                      <a:latin typeface="+mn-lt"/>
+                    </a:rPr>
+                    <a:t>a</a:t>
+                  </a:r>
+                  <a:endParaRPr kumimoji="0" lang="en-US" sz="1600" b="0" i="1" u="none" strike="noStrike" cap="none" normalizeH="0" baseline="0" dirty="0">
+                    <a:ln>
+                      <a:noFill/>
+                    </a:ln>
+                    <a:solidFill>
+                      <a:schemeClr val="tx2"/>
+                    </a:solidFill>
+                    <a:effectLst/>
+                    <a:latin typeface="+mn-lt"/>
+                  </a:endParaRPr>
+                </a:p>
+              </p:txBody>
+            </p:sp>
+            <p:sp>
+              <p:nvSpPr>
+                <p:cNvPr id="33" name="Oval 32">
+                  <a:extLst>
+                    <a:ext uri="{FF2B5EF4-FFF2-40B4-BE49-F238E27FC236}">
+                      <a16:creationId xmlns:a16="http://schemas.microsoft.com/office/drawing/2014/main" id="{0E551FD5-74B8-AFD1-B002-563403B21852}"/>
+                    </a:ext>
+                  </a:extLst>
+                </p:cNvPr>
+                <p:cNvSpPr/>
+                <p:nvPr/>
+              </p:nvSpPr>
+              <p:spPr bwMode="auto">
+                <a:xfrm>
+                  <a:off x="970367" y="4856455"/>
+                  <a:ext cx="289704" cy="291076"/>
+                </a:xfrm>
+                <a:prstGeom prst="ellipse">
+                  <a:avLst/>
+                </a:prstGeom>
+                <a:solidFill>
+                  <a:srgbClr val="CCFFCC"/>
+                </a:solidFill>
+                <a:ln w="12700" cap="flat" cmpd="sng" algn="ctr">
+                  <a:solidFill>
+                    <a:schemeClr val="tx1"/>
+                  </a:solidFill>
+                  <a:prstDash val="solid"/>
+                  <a:round/>
+                  <a:headEnd type="none" w="sm" len="sm"/>
+                  <a:tailEnd type="none" w="sm" len="sm"/>
+                </a:ln>
+                <a:effectLst/>
+              </p:spPr>
+              <p:txBody>
+                <a:bodyPr vert="horz" wrap="none" lIns="0" tIns="0" rIns="0" bIns="0" numCol="1" rtlCol="0" anchor="ctr" anchorCtr="1" compatLnSpc="1">
+                  <a:prstTxWarp prst="textNoShape">
+                    <a:avLst/>
+                  </a:prstTxWarp>
+                </a:bodyPr>
+                <a:lstStyle/>
+                <a:p>
+                  <a:pPr marL="0" marR="0" indent="0" algn="l" defTabSz="914400" rtl="0" eaLnBrk="0" fontAlgn="base" latinLnBrk="0" hangingPunct="0">
+                    <a:lnSpc>
+                      <a:spcPct val="100000"/>
+                    </a:lnSpc>
+                    <a:spcBef>
+                      <a:spcPct val="0"/>
+                    </a:spcBef>
+                    <a:spcAft>
+                      <a:spcPct val="0"/>
+                    </a:spcAft>
+                    <a:buClrTx/>
+                    <a:buSzTx/>
+                    <a:buFontTx/>
+                    <a:buNone/>
+                    <a:tabLst/>
+                  </a:pPr>
+                  <a:r>
+                    <a:rPr lang="en-US" i="1" dirty="0">
+                      <a:latin typeface="+mn-lt"/>
+                    </a:rPr>
+                    <a:t>c</a:t>
+                  </a:r>
+                  <a:endParaRPr kumimoji="0" lang="en-US" sz="1600" b="0" i="1" u="none" strike="noStrike" cap="none" normalizeH="0" baseline="0" dirty="0">
+                    <a:ln>
+                      <a:noFill/>
+                    </a:ln>
+                    <a:solidFill>
+                      <a:schemeClr val="tx2"/>
+                    </a:solidFill>
+                    <a:effectLst/>
+                    <a:latin typeface="+mn-lt"/>
+                  </a:endParaRPr>
+                </a:p>
+              </p:txBody>
+            </p:sp>
+            <p:sp>
+              <p:nvSpPr>
+                <p:cNvPr id="34" name="Oval 33">
+                  <a:extLst>
+                    <a:ext uri="{FF2B5EF4-FFF2-40B4-BE49-F238E27FC236}">
+                      <a16:creationId xmlns:a16="http://schemas.microsoft.com/office/drawing/2014/main" id="{73270A3E-CE75-C6E0-00E5-A5B1C7D8E9EA}"/>
+                    </a:ext>
+                  </a:extLst>
+                </p:cNvPr>
+                <p:cNvSpPr/>
+                <p:nvPr/>
+              </p:nvSpPr>
+              <p:spPr bwMode="auto">
+                <a:xfrm>
+                  <a:off x="1735050" y="3706080"/>
+                  <a:ext cx="289704" cy="291076"/>
+                </a:xfrm>
+                <a:prstGeom prst="ellipse">
+                  <a:avLst/>
+                </a:prstGeom>
+                <a:solidFill>
+                  <a:srgbClr val="CCFFCC"/>
+                </a:solidFill>
+                <a:ln w="12700" cap="flat" cmpd="sng" algn="ctr">
+                  <a:solidFill>
+                    <a:schemeClr val="tx1"/>
+                  </a:solidFill>
+                  <a:prstDash val="solid"/>
+                  <a:round/>
+                  <a:headEnd type="none" w="sm" len="sm"/>
+                  <a:tailEnd type="none" w="sm" len="sm"/>
+                </a:ln>
+                <a:effectLst/>
+              </p:spPr>
+              <p:txBody>
+                <a:bodyPr vert="horz" wrap="none" lIns="0" tIns="0" rIns="0" bIns="0" numCol="1" rtlCol="0" anchor="ctr" anchorCtr="1" compatLnSpc="1">
+                  <a:prstTxWarp prst="textNoShape">
+                    <a:avLst/>
+                  </a:prstTxWarp>
+                </a:bodyPr>
+                <a:lstStyle/>
+                <a:p>
+                  <a:pPr marL="0" marR="0" indent="0" algn="l" defTabSz="914400" rtl="0" eaLnBrk="0" fontAlgn="base" latinLnBrk="0" hangingPunct="0">
+                    <a:lnSpc>
+                      <a:spcPct val="100000"/>
+                    </a:lnSpc>
+                    <a:spcBef>
+                      <a:spcPct val="0"/>
+                    </a:spcBef>
+                    <a:spcAft>
+                      <a:spcPct val="0"/>
+                    </a:spcAft>
+                    <a:buClrTx/>
+                    <a:buSzTx/>
+                    <a:buFontTx/>
+                    <a:buNone/>
+                    <a:tabLst/>
+                  </a:pPr>
+                  <a:r>
+                    <a:rPr lang="en-US" i="1" dirty="0">
+                      <a:latin typeface="+mn-lt"/>
+                    </a:rPr>
+                    <a:t>b</a:t>
+                  </a:r>
+                  <a:endParaRPr kumimoji="0" lang="en-US" sz="1600" b="0" i="1" u="none" strike="noStrike" cap="none" normalizeH="0" baseline="0" dirty="0">
+                    <a:ln>
+                      <a:noFill/>
+                    </a:ln>
+                    <a:solidFill>
+                      <a:schemeClr val="tx2"/>
+                    </a:solidFill>
+                    <a:effectLst/>
+                    <a:latin typeface="+mn-lt"/>
+                  </a:endParaRPr>
+                </a:p>
+              </p:txBody>
+            </p:sp>
+            <p:sp>
+              <p:nvSpPr>
+                <p:cNvPr id="35" name="Oval 34">
+                  <a:extLst>
+                    <a:ext uri="{FF2B5EF4-FFF2-40B4-BE49-F238E27FC236}">
+                      <a16:creationId xmlns:a16="http://schemas.microsoft.com/office/drawing/2014/main" id="{EC9637D2-0015-7EAE-C0FF-FBF033395E6E}"/>
+                    </a:ext>
+                  </a:extLst>
+                </p:cNvPr>
+                <p:cNvSpPr/>
+                <p:nvPr/>
+              </p:nvSpPr>
+              <p:spPr bwMode="auto">
+                <a:xfrm>
+                  <a:off x="2438272" y="4856455"/>
+                  <a:ext cx="289704" cy="291076"/>
+                </a:xfrm>
+                <a:prstGeom prst="ellipse">
+                  <a:avLst/>
+                </a:prstGeom>
+                <a:solidFill>
+                  <a:srgbClr val="CCFFCC"/>
+                </a:solidFill>
+                <a:ln w="12700" cap="flat" cmpd="sng" algn="ctr">
+                  <a:solidFill>
+                    <a:schemeClr val="tx1"/>
+                  </a:solidFill>
+                  <a:prstDash val="solid"/>
+                  <a:round/>
+                  <a:headEnd type="none" w="sm" len="sm"/>
+                  <a:tailEnd type="none" w="sm" len="sm"/>
+                </a:ln>
+                <a:effectLst/>
+              </p:spPr>
+              <p:txBody>
+                <a:bodyPr vert="horz" wrap="none" lIns="0" tIns="0" rIns="0" bIns="0" numCol="1" rtlCol="0" anchor="ctr" anchorCtr="1" compatLnSpc="1">
+                  <a:prstTxWarp prst="textNoShape">
+                    <a:avLst/>
+                  </a:prstTxWarp>
+                </a:bodyPr>
+                <a:lstStyle/>
+                <a:p>
+                  <a:pPr marL="0" marR="0" indent="0" algn="l" defTabSz="914400" rtl="0" eaLnBrk="0" fontAlgn="base" latinLnBrk="0" hangingPunct="0">
+                    <a:lnSpc>
+                      <a:spcPct val="100000"/>
+                    </a:lnSpc>
+                    <a:spcBef>
+                      <a:spcPct val="0"/>
+                    </a:spcBef>
+                    <a:spcAft>
+                      <a:spcPct val="0"/>
+                    </a:spcAft>
+                    <a:buClrTx/>
+                    <a:buSzTx/>
+                    <a:buFontTx/>
+                    <a:buNone/>
+                    <a:tabLst/>
+                  </a:pPr>
+                  <a:r>
+                    <a:rPr lang="en-US" i="1" dirty="0">
+                      <a:latin typeface="+mn-lt"/>
+                    </a:rPr>
+                    <a:t>d</a:t>
+                  </a:r>
+                  <a:endParaRPr kumimoji="0" lang="en-US" sz="1600" b="0" i="1" u="none" strike="noStrike" cap="none" normalizeH="0" baseline="0" dirty="0">
+                    <a:ln>
+                      <a:noFill/>
+                    </a:ln>
+                    <a:solidFill>
+                      <a:schemeClr val="tx2"/>
+                    </a:solidFill>
+                    <a:effectLst/>
+                    <a:latin typeface="+mn-lt"/>
+                  </a:endParaRPr>
+                </a:p>
+              </p:txBody>
+            </p:sp>
+            <p:cxnSp>
+              <p:nvCxnSpPr>
+                <p:cNvPr id="36" name="Straight Connector 35">
+                  <a:extLst>
+                    <a:ext uri="{FF2B5EF4-FFF2-40B4-BE49-F238E27FC236}">
+                      <a16:creationId xmlns:a16="http://schemas.microsoft.com/office/drawing/2014/main" id="{F4919810-69DE-27CD-70EA-6A75ACFEDC09}"/>
+                    </a:ext>
+                  </a:extLst>
+                </p:cNvPr>
+                <p:cNvCxnSpPr>
+                  <a:cxnSpLocks/>
+                  <a:stCxn id="32" idx="6"/>
+                  <a:endCxn id="34" idx="2"/>
+                </p:cNvCxnSpPr>
+                <p:nvPr/>
+              </p:nvCxnSpPr>
+              <p:spPr bwMode="auto">
+                <a:xfrm>
+                  <a:off x="612397" y="3851618"/>
+                  <a:ext cx="1122653" cy="0"/>
+                </a:xfrm>
+                <a:prstGeom prst="line">
+                  <a:avLst/>
+                </a:prstGeom>
+                <a:solidFill>
+                  <a:schemeClr val="accent1"/>
+                </a:solidFill>
+                <a:ln w="12700" cap="flat" cmpd="sng" algn="ctr">
+                  <a:solidFill>
+                    <a:schemeClr val="tx1"/>
+                  </a:solidFill>
+                  <a:prstDash val="solid"/>
+                  <a:round/>
+                  <a:headEnd type="none" w="sm" len="sm"/>
+                  <a:tailEnd type="none" w="sm" len="sm"/>
+                </a:ln>
+                <a:effectLst/>
+              </p:spPr>
+            </p:cxnSp>
+            <p:cxnSp>
+              <p:nvCxnSpPr>
+                <p:cNvPr id="37" name="Straight Connector 36">
+                  <a:extLst>
+                    <a:ext uri="{FF2B5EF4-FFF2-40B4-BE49-F238E27FC236}">
+                      <a16:creationId xmlns:a16="http://schemas.microsoft.com/office/drawing/2014/main" id="{8BB51688-3ED2-3C0C-6EB2-62C5AAC52CA3}"/>
+                    </a:ext>
+                  </a:extLst>
+                </p:cNvPr>
+                <p:cNvCxnSpPr>
+                  <a:cxnSpLocks/>
+                  <a:stCxn id="34" idx="3"/>
+                  <a:endCxn id="33" idx="7"/>
+                </p:cNvCxnSpPr>
+                <p:nvPr/>
+              </p:nvCxnSpPr>
+              <p:spPr bwMode="auto">
+                <a:xfrm flipH="1">
+                  <a:off x="1217645" y="3954529"/>
+                  <a:ext cx="559831" cy="944553"/>
+                </a:xfrm>
+                <a:prstGeom prst="line">
+                  <a:avLst/>
+                </a:prstGeom>
+                <a:solidFill>
+                  <a:schemeClr val="accent1"/>
+                </a:solidFill>
+                <a:ln w="12700" cap="flat" cmpd="sng" algn="ctr">
+                  <a:solidFill>
+                    <a:schemeClr val="tx1"/>
+                  </a:solidFill>
+                  <a:prstDash val="solid"/>
+                  <a:round/>
+                  <a:headEnd type="none" w="sm" len="sm"/>
+                  <a:tailEnd type="none" w="sm" len="sm"/>
+                </a:ln>
+                <a:effectLst/>
+              </p:spPr>
+            </p:cxnSp>
+            <p:cxnSp>
+              <p:nvCxnSpPr>
+                <p:cNvPr id="38" name="Straight Connector 37">
+                  <a:extLst>
+                    <a:ext uri="{FF2B5EF4-FFF2-40B4-BE49-F238E27FC236}">
+                      <a16:creationId xmlns:a16="http://schemas.microsoft.com/office/drawing/2014/main" id="{017B6898-25D4-6A8D-18CE-D1B47058E917}"/>
+                    </a:ext>
+                  </a:extLst>
+                </p:cNvPr>
+                <p:cNvCxnSpPr>
+                  <a:cxnSpLocks/>
+                  <a:stCxn id="33" idx="6"/>
+                  <a:endCxn id="35" idx="2"/>
+                </p:cNvCxnSpPr>
+                <p:nvPr/>
+              </p:nvCxnSpPr>
+              <p:spPr bwMode="auto">
+                <a:xfrm>
+                  <a:off x="1260071" y="5001993"/>
+                  <a:ext cx="1178201" cy="0"/>
+                </a:xfrm>
+                <a:prstGeom prst="line">
+                  <a:avLst/>
+                </a:prstGeom>
+                <a:solidFill>
+                  <a:schemeClr val="accent1"/>
+                </a:solidFill>
+                <a:ln w="12700" cap="flat" cmpd="sng" algn="ctr">
+                  <a:solidFill>
+                    <a:schemeClr val="tx1"/>
+                  </a:solidFill>
+                  <a:prstDash val="solid"/>
+                  <a:round/>
+                  <a:headEnd type="none" w="sm" len="sm"/>
+                  <a:tailEnd type="none" w="sm" len="sm"/>
+                </a:ln>
+                <a:effectLst/>
+              </p:spPr>
+            </p:cxnSp>
+            <p:cxnSp>
+              <p:nvCxnSpPr>
+                <p:cNvPr id="19" name="Straight Connector 18">
+                  <a:extLst>
+                    <a:ext uri="{FF2B5EF4-FFF2-40B4-BE49-F238E27FC236}">
+                      <a16:creationId xmlns:a16="http://schemas.microsoft.com/office/drawing/2014/main" id="{9536B440-983E-AC71-B442-3778794E3B8A}"/>
+                    </a:ext>
+                  </a:extLst>
+                </p:cNvPr>
+                <p:cNvCxnSpPr>
+                  <a:cxnSpLocks/>
+                  <a:stCxn id="5" idx="3"/>
+                  <a:endCxn id="35" idx="7"/>
+                </p:cNvCxnSpPr>
+                <p:nvPr/>
+              </p:nvCxnSpPr>
+              <p:spPr bwMode="auto">
+                <a:xfrm flipH="1">
+                  <a:off x="2685550" y="3943702"/>
+                  <a:ext cx="457405" cy="955380"/>
+                </a:xfrm>
+                <a:prstGeom prst="line">
+                  <a:avLst/>
+                </a:prstGeom>
+                <a:solidFill>
+                  <a:schemeClr val="accent1"/>
+                </a:solidFill>
+                <a:ln w="12700" cap="flat" cmpd="sng" algn="ctr">
+                  <a:solidFill>
+                    <a:schemeClr val="tx1"/>
+                  </a:solidFill>
+                  <a:prstDash val="solid"/>
+                  <a:round/>
+                  <a:headEnd type="none" w="sm" len="sm"/>
+                  <a:tailEnd type="none" w="sm" len="sm"/>
+                </a:ln>
+                <a:effectLst/>
+              </p:spPr>
+            </p:cxnSp>
+            <p:cxnSp>
+              <p:nvCxnSpPr>
+                <p:cNvPr id="24" name="Straight Connector 23">
+                  <a:extLst>
+                    <a:ext uri="{FF2B5EF4-FFF2-40B4-BE49-F238E27FC236}">
+                      <a16:creationId xmlns:a16="http://schemas.microsoft.com/office/drawing/2014/main" id="{5239D3A9-3200-9D35-479A-91CC4376287C}"/>
+                    </a:ext>
+                  </a:extLst>
+                </p:cNvPr>
+                <p:cNvCxnSpPr>
+                  <a:cxnSpLocks/>
+                  <a:stCxn id="5" idx="2"/>
+                  <a:endCxn id="34" idx="6"/>
+                </p:cNvCxnSpPr>
+                <p:nvPr/>
+              </p:nvCxnSpPr>
+              <p:spPr bwMode="auto">
+                <a:xfrm flipH="1">
+                  <a:off x="2024754" y="3840791"/>
+                  <a:ext cx="1075775" cy="10827"/>
+                </a:xfrm>
+                <a:prstGeom prst="line">
+                  <a:avLst/>
+                </a:prstGeom>
+                <a:solidFill>
+                  <a:schemeClr val="accent1"/>
+                </a:solidFill>
+                <a:ln w="12700" cap="flat" cmpd="sng" algn="ctr">
+                  <a:solidFill>
+                    <a:schemeClr val="tx1"/>
+                  </a:solidFill>
+                  <a:prstDash val="solid"/>
+                  <a:round/>
+                  <a:headEnd type="none" w="sm" len="sm"/>
+                  <a:tailEnd type="none" w="sm" len="sm"/>
+                </a:ln>
+                <a:effectLst/>
+              </p:spPr>
+            </p:cxnSp>
+            <p:cxnSp>
+              <p:nvCxnSpPr>
+                <p:cNvPr id="29" name="Straight Connector 28">
+                  <a:extLst>
+                    <a:ext uri="{FF2B5EF4-FFF2-40B4-BE49-F238E27FC236}">
+                      <a16:creationId xmlns:a16="http://schemas.microsoft.com/office/drawing/2014/main" id="{C867DB60-7E55-5140-E86A-A0F6AA81581B}"/>
+                    </a:ext>
+                  </a:extLst>
+                </p:cNvPr>
+                <p:cNvCxnSpPr>
+                  <a:cxnSpLocks/>
+                  <a:stCxn id="32" idx="5"/>
+                  <a:endCxn id="33" idx="1"/>
+                </p:cNvCxnSpPr>
+                <p:nvPr/>
+              </p:nvCxnSpPr>
+              <p:spPr bwMode="auto">
+                <a:xfrm>
+                  <a:off x="569971" y="3954529"/>
+                  <a:ext cx="442822" cy="944553"/>
+                </a:xfrm>
+                <a:prstGeom prst="line">
+                  <a:avLst/>
+                </a:prstGeom>
+                <a:solidFill>
+                  <a:schemeClr val="accent1"/>
+                </a:solidFill>
+                <a:ln w="12700" cap="flat" cmpd="sng" algn="ctr">
+                  <a:solidFill>
+                    <a:schemeClr val="tx1"/>
+                  </a:solidFill>
+                  <a:prstDash val="solid"/>
+                  <a:round/>
+                  <a:headEnd type="none" w="sm" len="sm"/>
+                  <a:tailEnd type="none" w="sm" len="sm"/>
+                </a:ln>
+                <a:effectLst/>
+              </p:spPr>
+            </p:cxnSp>
+            <p:cxnSp>
+              <p:nvCxnSpPr>
+                <p:cNvPr id="80" name="Straight Connector 79">
+                  <a:extLst>
+                    <a:ext uri="{FF2B5EF4-FFF2-40B4-BE49-F238E27FC236}">
+                      <a16:creationId xmlns:a16="http://schemas.microsoft.com/office/drawing/2014/main" id="{9F616FFE-48FA-4BC9-DE44-C6E37861EE5E}"/>
+                    </a:ext>
+                  </a:extLst>
+                </p:cNvPr>
+                <p:cNvCxnSpPr>
+                  <a:cxnSpLocks/>
+                  <a:stCxn id="34" idx="5"/>
+                  <a:endCxn id="35" idx="1"/>
+                </p:cNvCxnSpPr>
+                <p:nvPr/>
+              </p:nvCxnSpPr>
+              <p:spPr bwMode="auto">
+                <a:xfrm>
+                  <a:off x="1982328" y="3954529"/>
+                  <a:ext cx="498370" cy="944553"/>
+                </a:xfrm>
+                <a:prstGeom prst="line">
+                  <a:avLst/>
+                </a:prstGeom>
+                <a:solidFill>
+                  <a:schemeClr val="accent1"/>
+                </a:solidFill>
+                <a:ln w="12700" cap="flat" cmpd="sng" algn="ctr">
+                  <a:solidFill>
+                    <a:schemeClr val="tx1"/>
+                  </a:solidFill>
+                  <a:prstDash val="solid"/>
+                  <a:round/>
+                  <a:headEnd type="none" w="sm" len="sm"/>
+                  <a:tailEnd type="none" w="sm" len="sm"/>
+                </a:ln>
+                <a:effectLst/>
+              </p:spPr>
+            </p:cxnSp>
+          </p:grpSp>
+          <p:grpSp>
+            <p:nvGrpSpPr>
+              <p:cNvPr id="160" name="Group 159">
+                <a:extLst>
+                  <a:ext uri="{FF2B5EF4-FFF2-40B4-BE49-F238E27FC236}">
+                    <a16:creationId xmlns:a16="http://schemas.microsoft.com/office/drawing/2014/main" id="{08D8F1AD-A8FC-4266-40EB-EF8AD8E750A2}"/>
+                  </a:ext>
+                </a:extLst>
+              </p:cNvPr>
+              <p:cNvGrpSpPr/>
+              <p:nvPr/>
+            </p:nvGrpSpPr>
+            <p:grpSpPr>
+              <a:xfrm>
+                <a:off x="4328872" y="3032664"/>
+                <a:ext cx="4492459" cy="2728569"/>
+                <a:chOff x="4328872" y="3032664"/>
+                <a:chExt cx="4492459" cy="2728569"/>
+              </a:xfrm>
+            </p:grpSpPr>
+            <p:cxnSp>
+              <p:nvCxnSpPr>
+                <p:cNvPr id="56" name="Straight Connector 55">
+                  <a:extLst>
+                    <a:ext uri="{FF2B5EF4-FFF2-40B4-BE49-F238E27FC236}">
+                      <a16:creationId xmlns:a16="http://schemas.microsoft.com/office/drawing/2014/main" id="{05926197-40A1-6F1B-5C3D-4C4729B188B0}"/>
+                    </a:ext>
+                  </a:extLst>
+                </p:cNvPr>
+                <p:cNvCxnSpPr>
+                  <a:cxnSpLocks/>
+                </p:cNvCxnSpPr>
+                <p:nvPr/>
+              </p:nvCxnSpPr>
+              <p:spPr bwMode="auto">
+                <a:xfrm flipV="1">
+                  <a:off x="5718555" y="3391521"/>
+                  <a:ext cx="471354" cy="363996"/>
+                </a:xfrm>
+                <a:prstGeom prst="line">
+                  <a:avLst/>
+                </a:prstGeom>
+                <a:solidFill>
+                  <a:schemeClr val="accent1"/>
+                </a:solidFill>
+                <a:ln w="12700" cap="flat" cmpd="sng" algn="ctr">
+                  <a:solidFill>
+                    <a:schemeClr val="tx1"/>
+                  </a:solidFill>
+                  <a:prstDash val="solid"/>
+                  <a:round/>
+                  <a:headEnd type="none" w="sm" len="sm"/>
+                  <a:tailEnd type="none" w="sm" len="sm"/>
+                </a:ln>
+                <a:effectLst/>
+              </p:spPr>
+            </p:cxnSp>
+            <p:cxnSp>
+              <p:nvCxnSpPr>
+                <p:cNvPr id="65" name="Straight Connector 64">
+                  <a:extLst>
+                    <a:ext uri="{FF2B5EF4-FFF2-40B4-BE49-F238E27FC236}">
+                      <a16:creationId xmlns:a16="http://schemas.microsoft.com/office/drawing/2014/main" id="{24A7C62C-14F7-11FB-E098-34D91ACBD000}"/>
+                    </a:ext>
+                  </a:extLst>
+                </p:cNvPr>
+                <p:cNvCxnSpPr>
+                  <a:cxnSpLocks/>
+                </p:cNvCxnSpPr>
+                <p:nvPr/>
+              </p:nvCxnSpPr>
+              <p:spPr bwMode="auto">
+                <a:xfrm flipV="1">
+                  <a:off x="4555182" y="3739595"/>
+                  <a:ext cx="146872" cy="379857"/>
+                </a:xfrm>
+                <a:prstGeom prst="line">
+                  <a:avLst/>
+                </a:prstGeom>
+                <a:solidFill>
+                  <a:schemeClr val="accent1"/>
+                </a:solidFill>
+                <a:ln w="0" cap="flat" cmpd="sng" algn="ctr">
+                  <a:solidFill>
+                    <a:schemeClr val="tx1"/>
+                  </a:solidFill>
+                  <a:prstDash val="solid"/>
+                  <a:round/>
+                  <a:headEnd type="oval" w="lg" len="lg"/>
+                  <a:tailEnd type="oval" w="lg" len="lg"/>
+                </a:ln>
+                <a:effectLst/>
+              </p:spPr>
+            </p:cxnSp>
+            <p:cxnSp>
+              <p:nvCxnSpPr>
+                <p:cNvPr id="67" name="Straight Connector 66">
+                  <a:extLst>
+                    <a:ext uri="{FF2B5EF4-FFF2-40B4-BE49-F238E27FC236}">
+                      <a16:creationId xmlns:a16="http://schemas.microsoft.com/office/drawing/2014/main" id="{22455F00-5F9E-CEE8-6245-BEC2CD35E2F4}"/>
+                    </a:ext>
+                  </a:extLst>
+                </p:cNvPr>
+                <p:cNvCxnSpPr>
+                  <a:cxnSpLocks/>
+                </p:cNvCxnSpPr>
+                <p:nvPr/>
+              </p:nvCxnSpPr>
+              <p:spPr bwMode="auto">
+                <a:xfrm flipH="1">
+                  <a:off x="6189909" y="3400962"/>
+                  <a:ext cx="5891" cy="332152"/>
+                </a:xfrm>
+                <a:prstGeom prst="line">
+                  <a:avLst/>
+                </a:prstGeom>
+                <a:solidFill>
+                  <a:schemeClr val="accent1"/>
+                </a:solidFill>
+                <a:ln w="12700" cap="flat" cmpd="sng" algn="ctr">
+                  <a:solidFill>
+                    <a:schemeClr val="tx1"/>
+                  </a:solidFill>
+                  <a:prstDash val="solid"/>
+                  <a:round/>
+                  <a:headEnd type="oval" w="lg" len="lg"/>
+                  <a:tailEnd type="oval" w="lg" len="lg"/>
+                </a:ln>
+                <a:effectLst/>
+              </p:spPr>
+            </p:cxnSp>
+            <p:cxnSp>
+              <p:nvCxnSpPr>
+                <p:cNvPr id="68" name="Straight Connector 67">
+                  <a:extLst>
+                    <a:ext uri="{FF2B5EF4-FFF2-40B4-BE49-F238E27FC236}">
+                      <a16:creationId xmlns:a16="http://schemas.microsoft.com/office/drawing/2014/main" id="{4D475EC5-28C6-3378-D729-0D3C661E4E14}"/>
+                    </a:ext>
+                  </a:extLst>
+                </p:cNvPr>
+                <p:cNvCxnSpPr>
+                  <a:cxnSpLocks/>
+                </p:cNvCxnSpPr>
+                <p:nvPr/>
+              </p:nvCxnSpPr>
+              <p:spPr bwMode="auto">
+                <a:xfrm flipV="1">
+                  <a:off x="5952944" y="3391521"/>
+                  <a:ext cx="236965" cy="341593"/>
+                </a:xfrm>
+                <a:prstGeom prst="line">
+                  <a:avLst/>
+                </a:prstGeom>
+                <a:solidFill>
+                  <a:schemeClr val="accent1"/>
+                </a:solidFill>
+                <a:ln w="12700" cap="flat" cmpd="sng" algn="ctr">
+                  <a:solidFill>
+                    <a:schemeClr val="tx1"/>
+                  </a:solidFill>
+                  <a:prstDash val="solid"/>
+                  <a:round/>
+                  <a:headEnd type="oval" w="lg" len="lg"/>
+                  <a:tailEnd type="oval" w="lg" len="lg"/>
+                </a:ln>
+                <a:effectLst/>
+              </p:spPr>
+            </p:cxnSp>
+            <p:cxnSp>
+              <p:nvCxnSpPr>
+                <p:cNvPr id="70" name="Straight Connector 69">
+                  <a:extLst>
+                    <a:ext uri="{FF2B5EF4-FFF2-40B4-BE49-F238E27FC236}">
+                      <a16:creationId xmlns:a16="http://schemas.microsoft.com/office/drawing/2014/main" id="{72ABF37A-230D-732F-2DDE-BC1076B14EE7}"/>
+                    </a:ext>
+                  </a:extLst>
+                </p:cNvPr>
+                <p:cNvCxnSpPr>
+                  <a:cxnSpLocks/>
+                </p:cNvCxnSpPr>
+                <p:nvPr/>
+              </p:nvCxnSpPr>
+              <p:spPr bwMode="auto">
+                <a:xfrm flipV="1">
+                  <a:off x="5719964" y="3396616"/>
+                  <a:ext cx="170146" cy="336498"/>
+                </a:xfrm>
+                <a:prstGeom prst="line">
+                  <a:avLst/>
+                </a:prstGeom>
+                <a:solidFill>
+                  <a:schemeClr val="accent1"/>
+                </a:solidFill>
+                <a:ln w="12700" cap="flat" cmpd="sng" algn="ctr">
+                  <a:solidFill>
+                    <a:schemeClr val="tx1"/>
+                  </a:solidFill>
+                  <a:prstDash val="solid"/>
+                  <a:round/>
+                  <a:headEnd type="oval" w="lg" len="lg"/>
+                  <a:tailEnd type="oval" w="lg" len="lg"/>
+                </a:ln>
+                <a:effectLst/>
+              </p:spPr>
+            </p:cxnSp>
+            <p:cxnSp>
+              <p:nvCxnSpPr>
+                <p:cNvPr id="73" name="Straight Connector 72">
+                  <a:extLst>
+                    <a:ext uri="{FF2B5EF4-FFF2-40B4-BE49-F238E27FC236}">
+                      <a16:creationId xmlns:a16="http://schemas.microsoft.com/office/drawing/2014/main" id="{0A76CCDC-7C12-B610-8E1B-19C076A2387F}"/>
+                    </a:ext>
+                  </a:extLst>
+                </p:cNvPr>
+                <p:cNvCxnSpPr>
+                  <a:cxnSpLocks/>
+                </p:cNvCxnSpPr>
+                <p:nvPr/>
+              </p:nvCxnSpPr>
+              <p:spPr bwMode="auto">
+                <a:xfrm>
+                  <a:off x="5886834" y="3400962"/>
+                  <a:ext cx="47995" cy="332152"/>
+                </a:xfrm>
+                <a:prstGeom prst="line">
+                  <a:avLst/>
+                </a:prstGeom>
+                <a:solidFill>
+                  <a:schemeClr val="accent1"/>
+                </a:solidFill>
+                <a:ln w="12700" cap="flat" cmpd="sng" algn="ctr">
+                  <a:solidFill>
+                    <a:schemeClr val="tx1"/>
+                  </a:solidFill>
+                  <a:prstDash val="solid"/>
+                  <a:round/>
+                  <a:headEnd type="none" w="sm" len="sm"/>
+                  <a:tailEnd type="none" w="sm" len="sm"/>
+                </a:ln>
+                <a:effectLst/>
+              </p:spPr>
+            </p:cxnSp>
+            <p:cxnSp>
+              <p:nvCxnSpPr>
+                <p:cNvPr id="75" name="Straight Connector 74">
+                  <a:extLst>
+                    <a:ext uri="{FF2B5EF4-FFF2-40B4-BE49-F238E27FC236}">
+                      <a16:creationId xmlns:a16="http://schemas.microsoft.com/office/drawing/2014/main" id="{E972B643-E4FF-FC44-9E97-376AD6CE8076}"/>
+                    </a:ext>
+                  </a:extLst>
+                </p:cNvPr>
+                <p:cNvCxnSpPr>
+                  <a:cxnSpLocks/>
+                </p:cNvCxnSpPr>
+                <p:nvPr/>
+              </p:nvCxnSpPr>
+              <p:spPr bwMode="auto">
+                <a:xfrm>
+                  <a:off x="5908225" y="3385040"/>
+                  <a:ext cx="294406" cy="348074"/>
+                </a:xfrm>
+                <a:prstGeom prst="line">
+                  <a:avLst/>
+                </a:prstGeom>
+                <a:solidFill>
+                  <a:schemeClr val="accent1"/>
+                </a:solidFill>
+                <a:ln w="12700" cap="flat" cmpd="sng" algn="ctr">
+                  <a:solidFill>
+                    <a:schemeClr val="tx1"/>
+                  </a:solidFill>
+                  <a:prstDash val="solid"/>
+                  <a:round/>
+                  <a:headEnd type="none" w="sm" len="sm"/>
+                  <a:tailEnd type="none" w="sm" len="sm"/>
+                </a:ln>
+                <a:effectLst/>
+              </p:spPr>
+            </p:cxnSp>
+            <p:cxnSp>
+              <p:nvCxnSpPr>
+                <p:cNvPr id="83" name="Straight Connector 82">
+                  <a:extLst>
+                    <a:ext uri="{FF2B5EF4-FFF2-40B4-BE49-F238E27FC236}">
+                      <a16:creationId xmlns:a16="http://schemas.microsoft.com/office/drawing/2014/main" id="{2B6857DD-6908-447C-1A3B-536EED1C0486}"/>
+                    </a:ext>
+                  </a:extLst>
+                </p:cNvPr>
+                <p:cNvCxnSpPr>
+                  <a:cxnSpLocks/>
+                </p:cNvCxnSpPr>
+                <p:nvPr/>
+              </p:nvCxnSpPr>
+              <p:spPr bwMode="auto">
+                <a:xfrm>
+                  <a:off x="6189909" y="3385040"/>
+                  <a:ext cx="257838" cy="348074"/>
+                </a:xfrm>
+                <a:prstGeom prst="line">
+                  <a:avLst/>
+                </a:prstGeom>
+                <a:solidFill>
+                  <a:schemeClr val="accent1"/>
+                </a:solidFill>
+                <a:ln w="12700" cap="flat" cmpd="sng" algn="ctr">
+                  <a:solidFill>
+                    <a:schemeClr val="tx1"/>
+                  </a:solidFill>
+                  <a:prstDash val="solid"/>
+                  <a:round/>
+                  <a:headEnd type="none" w="lg" len="lg"/>
+                  <a:tailEnd type="oval" w="lg" len="lg"/>
+                </a:ln>
+                <a:effectLst/>
+              </p:spPr>
+            </p:cxnSp>
+            <p:grpSp>
+              <p:nvGrpSpPr>
+                <p:cNvPr id="118" name="Group 117">
+                  <a:extLst>
+                    <a:ext uri="{FF2B5EF4-FFF2-40B4-BE49-F238E27FC236}">
+                      <a16:creationId xmlns:a16="http://schemas.microsoft.com/office/drawing/2014/main" id="{1B84C54E-2B12-D4F4-5396-E3BA3DFC7D5E}"/>
+                    </a:ext>
+                  </a:extLst>
+                </p:cNvPr>
+                <p:cNvGrpSpPr/>
+                <p:nvPr/>
+              </p:nvGrpSpPr>
+              <p:grpSpPr>
+                <a:xfrm flipV="1">
+                  <a:off x="6727167" y="5076601"/>
+                  <a:ext cx="729192" cy="370477"/>
+                  <a:chOff x="6548003" y="4827956"/>
+                  <a:chExt cx="729192" cy="370477"/>
+                </a:xfrm>
+              </p:grpSpPr>
+              <p:cxnSp>
+                <p:nvCxnSpPr>
+                  <p:cNvPr id="97" name="Straight Connector 96">
+                    <a:extLst>
+                      <a:ext uri="{FF2B5EF4-FFF2-40B4-BE49-F238E27FC236}">
+                        <a16:creationId xmlns:a16="http://schemas.microsoft.com/office/drawing/2014/main" id="{28972F3B-50FD-8404-7D7B-36D23343A83E}"/>
+                      </a:ext>
+                    </a:extLst>
+                  </p:cNvPr>
+                  <p:cNvCxnSpPr>
+                    <a:cxnSpLocks/>
+                  </p:cNvCxnSpPr>
+                  <p:nvPr/>
+                </p:nvCxnSpPr>
+                <p:spPr bwMode="auto">
+                  <a:xfrm flipV="1">
+                    <a:off x="6548003" y="4834437"/>
+                    <a:ext cx="471354" cy="363996"/>
+                  </a:xfrm>
+                  <a:prstGeom prst="line">
+                    <a:avLst/>
+                  </a:prstGeom>
+                  <a:solidFill>
+                    <a:schemeClr val="accent1"/>
+                  </a:solidFill>
+                  <a:ln w="12700" cap="flat" cmpd="sng" algn="ctr">
+                    <a:solidFill>
+                      <a:schemeClr val="tx1"/>
+                    </a:solidFill>
+                    <a:prstDash val="solid"/>
+                    <a:round/>
+                    <a:headEnd type="none" w="sm" len="sm"/>
+                    <a:tailEnd type="none" w="sm" len="sm"/>
+                  </a:ln>
+                  <a:effectLst/>
+                </p:spPr>
+              </p:cxnSp>
+              <p:cxnSp>
+                <p:nvCxnSpPr>
+                  <p:cNvPr id="98" name="Straight Connector 97">
+                    <a:extLst>
+                      <a:ext uri="{FF2B5EF4-FFF2-40B4-BE49-F238E27FC236}">
+                        <a16:creationId xmlns:a16="http://schemas.microsoft.com/office/drawing/2014/main" id="{78EB6EC3-0E84-4ACA-0F6B-9D7F9C3A263A}"/>
+                      </a:ext>
+                    </a:extLst>
+                  </p:cNvPr>
+                  <p:cNvCxnSpPr>
+                    <a:cxnSpLocks/>
+                  </p:cNvCxnSpPr>
+                  <p:nvPr/>
+                </p:nvCxnSpPr>
+                <p:spPr bwMode="auto">
+                  <a:xfrm flipH="1">
+                    <a:off x="7019357" y="4843878"/>
+                    <a:ext cx="5891" cy="332152"/>
+                  </a:xfrm>
+                  <a:prstGeom prst="line">
+                    <a:avLst/>
+                  </a:prstGeom>
+                  <a:solidFill>
+                    <a:schemeClr val="accent1"/>
+                  </a:solidFill>
+                  <a:ln w="12700" cap="flat" cmpd="sng" algn="ctr">
+                    <a:solidFill>
+                      <a:schemeClr val="tx1"/>
+                    </a:solidFill>
+                    <a:prstDash val="solid"/>
+                    <a:round/>
+                    <a:headEnd type="oval" w="lg" len="lg"/>
+                    <a:tailEnd type="oval" w="lg" len="lg"/>
+                  </a:ln>
+                  <a:effectLst/>
+                </p:spPr>
+              </p:cxnSp>
+              <p:cxnSp>
+                <p:nvCxnSpPr>
+                  <p:cNvPr id="99" name="Straight Connector 98">
+                    <a:extLst>
+                      <a:ext uri="{FF2B5EF4-FFF2-40B4-BE49-F238E27FC236}">
+                        <a16:creationId xmlns:a16="http://schemas.microsoft.com/office/drawing/2014/main" id="{A5049FCC-84DB-47FA-5F00-18CF69AE03E4}"/>
+                      </a:ext>
+                    </a:extLst>
+                  </p:cNvPr>
+                  <p:cNvCxnSpPr>
+                    <a:cxnSpLocks/>
+                  </p:cNvCxnSpPr>
+                  <p:nvPr/>
+                </p:nvCxnSpPr>
+                <p:spPr bwMode="auto">
+                  <a:xfrm flipV="1">
+                    <a:off x="6782392" y="4834437"/>
+                    <a:ext cx="236965" cy="341593"/>
+                  </a:xfrm>
+                  <a:prstGeom prst="line">
+                    <a:avLst/>
+                  </a:prstGeom>
+                  <a:solidFill>
+                    <a:schemeClr val="accent1"/>
+                  </a:solidFill>
+                  <a:ln w="12700" cap="flat" cmpd="sng" algn="ctr">
+                    <a:solidFill>
+                      <a:schemeClr val="tx1"/>
+                    </a:solidFill>
+                    <a:prstDash val="solid"/>
+                    <a:round/>
+                    <a:headEnd type="oval" w="lg" len="lg"/>
+                    <a:tailEnd type="oval" w="lg" len="lg"/>
+                  </a:ln>
+                  <a:effectLst/>
+                </p:spPr>
+              </p:cxnSp>
+              <p:cxnSp>
+                <p:nvCxnSpPr>
+                  <p:cNvPr id="100" name="Straight Connector 99">
+                    <a:extLst>
+                      <a:ext uri="{FF2B5EF4-FFF2-40B4-BE49-F238E27FC236}">
+                        <a16:creationId xmlns:a16="http://schemas.microsoft.com/office/drawing/2014/main" id="{E5F3694A-CEAE-8004-EEE2-EAA8B7C054BD}"/>
+                      </a:ext>
+                    </a:extLst>
+                  </p:cNvPr>
+                  <p:cNvCxnSpPr>
+                    <a:cxnSpLocks/>
+                  </p:cNvCxnSpPr>
+                  <p:nvPr/>
+                </p:nvCxnSpPr>
+                <p:spPr bwMode="auto">
+                  <a:xfrm flipV="1">
+                    <a:off x="6549412" y="4839532"/>
+                    <a:ext cx="170146" cy="336498"/>
+                  </a:xfrm>
+                  <a:prstGeom prst="line">
+                    <a:avLst/>
+                  </a:prstGeom>
+                  <a:solidFill>
+                    <a:schemeClr val="accent1"/>
+                  </a:solidFill>
+                  <a:ln w="12700" cap="flat" cmpd="sng" algn="ctr">
+                    <a:solidFill>
+                      <a:schemeClr val="tx1"/>
+                    </a:solidFill>
+                    <a:prstDash val="solid"/>
+                    <a:round/>
+                    <a:headEnd type="oval" w="lg" len="lg"/>
+                    <a:tailEnd type="oval" w="lg" len="lg"/>
+                  </a:ln>
+                  <a:effectLst/>
+                </p:spPr>
+              </p:cxnSp>
+              <p:cxnSp>
+                <p:nvCxnSpPr>
+                  <p:cNvPr id="101" name="Straight Connector 100">
+                    <a:extLst>
+                      <a:ext uri="{FF2B5EF4-FFF2-40B4-BE49-F238E27FC236}">
+                        <a16:creationId xmlns:a16="http://schemas.microsoft.com/office/drawing/2014/main" id="{E53A24F9-9CC9-4F5C-7935-4534BCA2B1CA}"/>
+                      </a:ext>
+                    </a:extLst>
+                  </p:cNvPr>
+                  <p:cNvCxnSpPr>
+                    <a:cxnSpLocks/>
+                  </p:cNvCxnSpPr>
+                  <p:nvPr/>
+                </p:nvCxnSpPr>
+                <p:spPr bwMode="auto">
+                  <a:xfrm>
+                    <a:off x="6716282" y="4843878"/>
+                    <a:ext cx="47995" cy="332152"/>
+                  </a:xfrm>
+                  <a:prstGeom prst="line">
+                    <a:avLst/>
+                  </a:prstGeom>
+                  <a:solidFill>
+                    <a:schemeClr val="accent1"/>
+                  </a:solidFill>
+                  <a:ln w="12700" cap="flat" cmpd="sng" algn="ctr">
+                    <a:solidFill>
+                      <a:schemeClr val="tx1"/>
+                    </a:solidFill>
+                    <a:prstDash val="solid"/>
+                    <a:round/>
+                    <a:headEnd type="none" w="sm" len="sm"/>
+                    <a:tailEnd type="none" w="sm" len="sm"/>
+                  </a:ln>
+                  <a:effectLst/>
+                </p:spPr>
+              </p:cxnSp>
+              <p:cxnSp>
+                <p:nvCxnSpPr>
+                  <p:cNvPr id="102" name="Straight Connector 101">
+                    <a:extLst>
+                      <a:ext uri="{FF2B5EF4-FFF2-40B4-BE49-F238E27FC236}">
+                        <a16:creationId xmlns:a16="http://schemas.microsoft.com/office/drawing/2014/main" id="{97E02E20-23F3-F500-5EB8-ABD7A428E497}"/>
+                      </a:ext>
+                    </a:extLst>
+                  </p:cNvPr>
+                  <p:cNvCxnSpPr>
+                    <a:cxnSpLocks/>
+                  </p:cNvCxnSpPr>
+                  <p:nvPr/>
+                </p:nvCxnSpPr>
+                <p:spPr bwMode="auto">
+                  <a:xfrm>
+                    <a:off x="6737673" y="4827956"/>
+                    <a:ext cx="294406" cy="348074"/>
+                  </a:xfrm>
+                  <a:prstGeom prst="line">
+                    <a:avLst/>
+                  </a:prstGeom>
+                  <a:solidFill>
+                    <a:schemeClr val="accent1"/>
+                  </a:solidFill>
+                  <a:ln w="12700" cap="flat" cmpd="sng" algn="ctr">
+                    <a:solidFill>
+                      <a:schemeClr val="tx1"/>
+                    </a:solidFill>
+                    <a:prstDash val="solid"/>
+                    <a:round/>
+                    <a:headEnd type="none" w="sm" len="sm"/>
+                    <a:tailEnd type="none" w="sm" len="sm"/>
+                  </a:ln>
+                  <a:effectLst/>
+                </p:spPr>
+              </p:cxnSp>
+              <p:cxnSp>
+                <p:nvCxnSpPr>
+                  <p:cNvPr id="103" name="Straight Connector 102">
+                    <a:extLst>
+                      <a:ext uri="{FF2B5EF4-FFF2-40B4-BE49-F238E27FC236}">
+                        <a16:creationId xmlns:a16="http://schemas.microsoft.com/office/drawing/2014/main" id="{73FD2359-C363-575D-5A3C-F65D48901750}"/>
+                      </a:ext>
+                    </a:extLst>
+                  </p:cNvPr>
+                  <p:cNvCxnSpPr>
+                    <a:cxnSpLocks/>
+                  </p:cNvCxnSpPr>
+                  <p:nvPr/>
+                </p:nvCxnSpPr>
+                <p:spPr bwMode="auto">
+                  <a:xfrm>
+                    <a:off x="7019357" y="4827956"/>
+                    <a:ext cx="257838" cy="348074"/>
+                  </a:xfrm>
+                  <a:prstGeom prst="line">
+                    <a:avLst/>
+                  </a:prstGeom>
+                  <a:solidFill>
+                    <a:schemeClr val="accent1"/>
+                  </a:solidFill>
+                  <a:ln w="12700" cap="flat" cmpd="sng" algn="ctr">
+                    <a:solidFill>
+                      <a:schemeClr val="tx1"/>
+                    </a:solidFill>
+                    <a:prstDash val="solid"/>
+                    <a:round/>
+                    <a:headEnd type="none" w="lg" len="lg"/>
+                    <a:tailEnd type="oval" w="lg" len="lg"/>
+                  </a:ln>
+                  <a:effectLst/>
+                </p:spPr>
+              </p:cxnSp>
+            </p:grpSp>
+            <p:cxnSp>
+              <p:nvCxnSpPr>
+                <p:cNvPr id="104" name="Straight Connector 103">
+                  <a:extLst>
+                    <a:ext uri="{FF2B5EF4-FFF2-40B4-BE49-F238E27FC236}">
+                      <a16:creationId xmlns:a16="http://schemas.microsoft.com/office/drawing/2014/main" id="{D934ACEF-E929-7668-5C4B-78425DF90E2A}"/>
+                    </a:ext>
+                  </a:extLst>
+                </p:cNvPr>
+                <p:cNvCxnSpPr>
+                  <a:cxnSpLocks/>
+                </p:cNvCxnSpPr>
+                <p:nvPr/>
+              </p:nvCxnSpPr>
+              <p:spPr bwMode="auto">
+                <a:xfrm flipH="1" flipV="1">
+                  <a:off x="7530454" y="3410027"/>
+                  <a:ext cx="212959" cy="332152"/>
+                </a:xfrm>
+                <a:prstGeom prst="line">
+                  <a:avLst/>
+                </a:prstGeom>
+                <a:solidFill>
+                  <a:schemeClr val="accent1"/>
+                </a:solidFill>
+                <a:ln w="12700" cap="flat" cmpd="sng" algn="ctr">
+                  <a:solidFill>
+                    <a:schemeClr val="tx1"/>
+                  </a:solidFill>
+                  <a:prstDash val="solid"/>
+                  <a:round/>
+                  <a:headEnd type="oval" w="lg" len="lg"/>
+                  <a:tailEnd type="none" w="sm" len="sm"/>
+                </a:ln>
+                <a:effectLst/>
+              </p:spPr>
+            </p:cxnSp>
+            <p:cxnSp>
+              <p:nvCxnSpPr>
+                <p:cNvPr id="105" name="Straight Connector 104">
+                  <a:extLst>
+                    <a:ext uri="{FF2B5EF4-FFF2-40B4-BE49-F238E27FC236}">
+                      <a16:creationId xmlns:a16="http://schemas.microsoft.com/office/drawing/2014/main" id="{3F76CA4D-601B-F7BF-A5D9-E8AFC950903A}"/>
+                    </a:ext>
+                  </a:extLst>
+                </p:cNvPr>
+                <p:cNvCxnSpPr>
+                  <a:cxnSpLocks/>
+                </p:cNvCxnSpPr>
+                <p:nvPr/>
+              </p:nvCxnSpPr>
+              <p:spPr bwMode="auto">
+                <a:xfrm flipH="1">
+                  <a:off x="7506448" y="3410027"/>
+                  <a:ext cx="5891" cy="332152"/>
+                </a:xfrm>
+                <a:prstGeom prst="line">
+                  <a:avLst/>
+                </a:prstGeom>
+                <a:solidFill>
+                  <a:schemeClr val="accent1"/>
+                </a:solidFill>
+                <a:ln w="12700" cap="flat" cmpd="sng" algn="ctr">
+                  <a:solidFill>
+                    <a:schemeClr val="tx1"/>
+                  </a:solidFill>
+                  <a:prstDash val="solid"/>
+                  <a:round/>
+                  <a:headEnd type="oval" w="lg" len="lg"/>
+                  <a:tailEnd type="oval" w="lg" len="lg"/>
+                </a:ln>
+                <a:effectLst/>
+              </p:spPr>
+            </p:cxnSp>
+            <p:cxnSp>
+              <p:nvCxnSpPr>
+                <p:cNvPr id="106" name="Straight Connector 105">
+                  <a:extLst>
+                    <a:ext uri="{FF2B5EF4-FFF2-40B4-BE49-F238E27FC236}">
+                      <a16:creationId xmlns:a16="http://schemas.microsoft.com/office/drawing/2014/main" id="{8321A2A9-C1F7-97B3-8E73-F07731652B35}"/>
+                    </a:ext>
+                  </a:extLst>
+                </p:cNvPr>
+                <p:cNvCxnSpPr>
+                  <a:cxnSpLocks/>
+                </p:cNvCxnSpPr>
+                <p:nvPr/>
+              </p:nvCxnSpPr>
+              <p:spPr bwMode="auto">
+                <a:xfrm flipV="1">
+                  <a:off x="7269483" y="3400586"/>
+                  <a:ext cx="236965" cy="341593"/>
+                </a:xfrm>
+                <a:prstGeom prst="line">
+                  <a:avLst/>
+                </a:prstGeom>
+                <a:solidFill>
+                  <a:schemeClr val="accent1"/>
+                </a:solidFill>
+                <a:ln w="12700" cap="flat" cmpd="sng" algn="ctr">
+                  <a:solidFill>
+                    <a:schemeClr val="tx1"/>
+                  </a:solidFill>
+                  <a:prstDash val="solid"/>
+                  <a:round/>
+                  <a:headEnd type="oval" w="lg" len="lg"/>
+                  <a:tailEnd type="oval" w="lg" len="lg"/>
+                </a:ln>
+                <a:effectLst/>
+              </p:spPr>
+            </p:cxnSp>
+            <p:grpSp>
+              <p:nvGrpSpPr>
+                <p:cNvPr id="119" name="Group 118">
+                  <a:extLst>
+                    <a:ext uri="{FF2B5EF4-FFF2-40B4-BE49-F238E27FC236}">
+                      <a16:creationId xmlns:a16="http://schemas.microsoft.com/office/drawing/2014/main" id="{77F07751-F507-731C-6071-8073F9E9D2F4}"/>
+                    </a:ext>
+                  </a:extLst>
+                </p:cNvPr>
+                <p:cNvGrpSpPr/>
+                <p:nvPr/>
+              </p:nvGrpSpPr>
+              <p:grpSpPr>
+                <a:xfrm flipV="1">
+                  <a:off x="5310014" y="5092549"/>
+                  <a:ext cx="473930" cy="341593"/>
+                  <a:chOff x="5540331" y="5966763"/>
+                  <a:chExt cx="473930" cy="341593"/>
+                </a:xfrm>
+              </p:grpSpPr>
+              <p:cxnSp>
+                <p:nvCxnSpPr>
+                  <p:cNvPr id="115" name="Straight Connector 114">
+                    <a:extLst>
+                      <a:ext uri="{FF2B5EF4-FFF2-40B4-BE49-F238E27FC236}">
+                        <a16:creationId xmlns:a16="http://schemas.microsoft.com/office/drawing/2014/main" id="{B8BA449E-357B-8AF5-8D1B-DF9FDFF6B38C}"/>
+                      </a:ext>
+                    </a:extLst>
+                  </p:cNvPr>
+                  <p:cNvCxnSpPr>
+                    <a:cxnSpLocks/>
+                  </p:cNvCxnSpPr>
+                  <p:nvPr/>
+                </p:nvCxnSpPr>
+                <p:spPr bwMode="auto">
+                  <a:xfrm flipH="1" flipV="1">
+                    <a:off x="6007672" y="6308356"/>
+                    <a:ext cx="6589" cy="0"/>
+                  </a:xfrm>
+                  <a:prstGeom prst="line">
+                    <a:avLst/>
+                  </a:prstGeom>
+                  <a:solidFill>
+                    <a:schemeClr val="accent1"/>
+                  </a:solidFill>
+                  <a:ln w="12700" cap="flat" cmpd="sng" algn="ctr">
+                    <a:solidFill>
+                      <a:schemeClr val="tx1"/>
+                    </a:solidFill>
+                    <a:prstDash val="solid"/>
+                    <a:round/>
+                    <a:headEnd type="oval" w="lg" len="lg"/>
+                    <a:tailEnd type="none" w="sm" len="sm"/>
+                  </a:ln>
+                  <a:effectLst/>
+                </p:spPr>
+              </p:cxnSp>
+              <p:cxnSp>
+                <p:nvCxnSpPr>
+                  <p:cNvPr id="116" name="Straight Connector 115">
+                    <a:extLst>
+                      <a:ext uri="{FF2B5EF4-FFF2-40B4-BE49-F238E27FC236}">
+                        <a16:creationId xmlns:a16="http://schemas.microsoft.com/office/drawing/2014/main" id="{5A5BC27E-EC7E-7FCD-4E66-C83A49F70815}"/>
+                      </a:ext>
+                    </a:extLst>
+                  </p:cNvPr>
+                  <p:cNvCxnSpPr>
+                    <a:cxnSpLocks/>
+                  </p:cNvCxnSpPr>
+                  <p:nvPr/>
+                </p:nvCxnSpPr>
+                <p:spPr bwMode="auto">
+                  <a:xfrm flipH="1">
+                    <a:off x="5777296" y="5976204"/>
+                    <a:ext cx="5891" cy="332152"/>
+                  </a:xfrm>
+                  <a:prstGeom prst="line">
+                    <a:avLst/>
+                  </a:prstGeom>
+                  <a:solidFill>
+                    <a:schemeClr val="accent1"/>
+                  </a:solidFill>
+                  <a:ln w="12700" cap="flat" cmpd="sng" algn="ctr">
+                    <a:solidFill>
+                      <a:schemeClr val="tx1"/>
+                    </a:solidFill>
+                    <a:prstDash val="solid"/>
+                    <a:round/>
+                    <a:headEnd type="oval" w="lg" len="lg"/>
+                    <a:tailEnd type="oval" w="lg" len="lg"/>
+                  </a:ln>
+                  <a:effectLst/>
+                </p:spPr>
+              </p:cxnSp>
+              <p:cxnSp>
+                <p:nvCxnSpPr>
+                  <p:cNvPr id="117" name="Straight Connector 116">
+                    <a:extLst>
+                      <a:ext uri="{FF2B5EF4-FFF2-40B4-BE49-F238E27FC236}">
+                        <a16:creationId xmlns:a16="http://schemas.microsoft.com/office/drawing/2014/main" id="{AE8E21DF-C060-262B-D5C5-9B3D2B75BF03}"/>
+                      </a:ext>
+                    </a:extLst>
+                  </p:cNvPr>
+                  <p:cNvCxnSpPr>
+                    <a:cxnSpLocks/>
+                  </p:cNvCxnSpPr>
+                  <p:nvPr/>
+                </p:nvCxnSpPr>
+                <p:spPr bwMode="auto">
+                  <a:xfrm flipV="1">
+                    <a:off x="5540331" y="5966763"/>
+                    <a:ext cx="236965" cy="341593"/>
+                  </a:xfrm>
+                  <a:prstGeom prst="line">
+                    <a:avLst/>
+                  </a:prstGeom>
+                  <a:solidFill>
+                    <a:schemeClr val="accent1"/>
+                  </a:solidFill>
+                  <a:ln w="12700" cap="flat" cmpd="sng" algn="ctr">
+                    <a:solidFill>
+                      <a:schemeClr val="tx1"/>
+                    </a:solidFill>
+                    <a:prstDash val="solid"/>
+                    <a:round/>
+                    <a:headEnd type="oval" w="lg" len="lg"/>
+                    <a:tailEnd type="oval" w="lg" len="lg"/>
+                  </a:ln>
+                  <a:effectLst/>
+                </p:spPr>
+              </p:cxnSp>
+            </p:grpSp>
+            <p:cxnSp>
+              <p:nvCxnSpPr>
+                <p:cNvPr id="120" name="Straight Connector 119">
+                  <a:extLst>
+                    <a:ext uri="{FF2B5EF4-FFF2-40B4-BE49-F238E27FC236}">
+                      <a16:creationId xmlns:a16="http://schemas.microsoft.com/office/drawing/2014/main" id="{2CE8D6D5-2DB9-7731-6DB1-9DCE5199378C}"/>
+                    </a:ext>
+                  </a:extLst>
+                </p:cNvPr>
+                <p:cNvCxnSpPr>
+                  <a:cxnSpLocks/>
+                </p:cNvCxnSpPr>
+                <p:nvPr/>
+              </p:nvCxnSpPr>
+              <p:spPr bwMode="auto">
+                <a:xfrm flipV="1">
+                  <a:off x="8508357" y="4746584"/>
+                  <a:ext cx="122851" cy="352420"/>
+                </a:xfrm>
+                <a:prstGeom prst="line">
+                  <a:avLst/>
+                </a:prstGeom>
+                <a:solidFill>
+                  <a:schemeClr val="accent1"/>
+                </a:solidFill>
+                <a:ln w="0" cap="flat" cmpd="sng" algn="ctr">
+                  <a:solidFill>
+                    <a:schemeClr val="tx1"/>
+                  </a:solidFill>
+                  <a:prstDash val="solid"/>
+                  <a:round/>
+                  <a:headEnd type="oval" w="lg" len="lg"/>
+                  <a:tailEnd type="oval" w="lg" len="lg"/>
+                </a:ln>
+                <a:effectLst/>
+              </p:spPr>
+            </p:cxnSp>
+            <p:cxnSp>
+              <p:nvCxnSpPr>
+                <p:cNvPr id="121" name="Straight Connector 120">
+                  <a:extLst>
+                    <a:ext uri="{FF2B5EF4-FFF2-40B4-BE49-F238E27FC236}">
+                      <a16:creationId xmlns:a16="http://schemas.microsoft.com/office/drawing/2014/main" id="{14EBD83E-A9A9-19C6-8EAE-90F94BE04A8F}"/>
+                    </a:ext>
+                  </a:extLst>
+                </p:cNvPr>
+                <p:cNvCxnSpPr>
+                  <a:cxnSpLocks/>
+                </p:cNvCxnSpPr>
+                <p:nvPr/>
+              </p:nvCxnSpPr>
+              <p:spPr bwMode="auto">
+                <a:xfrm>
+                  <a:off x="7743413" y="3749036"/>
+                  <a:ext cx="887795" cy="997548"/>
+                </a:xfrm>
+                <a:prstGeom prst="line">
+                  <a:avLst/>
+                </a:prstGeom>
+                <a:solidFill>
+                  <a:schemeClr val="accent1"/>
+                </a:solidFill>
+                <a:ln w="44450" cap="flat" cmpd="sng" algn="ctr">
+                  <a:solidFill>
+                    <a:schemeClr val="tx1"/>
+                  </a:solidFill>
+                  <a:prstDash val="solid"/>
+                  <a:round/>
+                  <a:headEnd type="none" w="sm" len="sm"/>
+                  <a:tailEnd type="none" w="sm" len="sm"/>
+                </a:ln>
+                <a:effectLst/>
+              </p:spPr>
+            </p:cxnSp>
+            <p:cxnSp>
+              <p:nvCxnSpPr>
+                <p:cNvPr id="122" name="Straight Connector 121">
+                  <a:extLst>
+                    <a:ext uri="{FF2B5EF4-FFF2-40B4-BE49-F238E27FC236}">
+                      <a16:creationId xmlns:a16="http://schemas.microsoft.com/office/drawing/2014/main" id="{80BB93F3-EDB4-3DB7-3AA1-396E5C782A33}"/>
+                    </a:ext>
+                  </a:extLst>
+                </p:cNvPr>
+                <p:cNvCxnSpPr>
+                  <a:cxnSpLocks/>
+                </p:cNvCxnSpPr>
+                <p:nvPr/>
+              </p:nvCxnSpPr>
+              <p:spPr bwMode="auto">
+                <a:xfrm flipV="1">
+                  <a:off x="7456359" y="5099004"/>
+                  <a:ext cx="1051998" cy="6248"/>
+                </a:xfrm>
+                <a:prstGeom prst="line">
+                  <a:avLst/>
+                </a:prstGeom>
+                <a:solidFill>
+                  <a:schemeClr val="accent1"/>
+                </a:solidFill>
+                <a:ln w="44450" cap="flat" cmpd="sng" algn="ctr">
+                  <a:solidFill>
+                    <a:schemeClr val="tx1"/>
+                  </a:solidFill>
+                  <a:prstDash val="solid"/>
+                  <a:round/>
+                  <a:headEnd type="none" w="sm" len="sm"/>
+                  <a:tailEnd type="none" w="sm" len="sm"/>
+                </a:ln>
+                <a:effectLst/>
+              </p:spPr>
+            </p:cxnSp>
+            <p:cxnSp>
+              <p:nvCxnSpPr>
+                <p:cNvPr id="123" name="Straight Connector 122">
+                  <a:extLst>
+                    <a:ext uri="{FF2B5EF4-FFF2-40B4-BE49-F238E27FC236}">
+                      <a16:creationId xmlns:a16="http://schemas.microsoft.com/office/drawing/2014/main" id="{1345AC54-B4E8-E846-3D92-AF9CA2B559A4}"/>
+                    </a:ext>
+                  </a:extLst>
+                </p:cNvPr>
+                <p:cNvCxnSpPr>
+                  <a:cxnSpLocks/>
+                </p:cNvCxnSpPr>
+                <p:nvPr/>
+              </p:nvCxnSpPr>
+              <p:spPr bwMode="auto">
+                <a:xfrm flipV="1">
+                  <a:off x="4678033" y="3749036"/>
+                  <a:ext cx="1040522" cy="12962"/>
+                </a:xfrm>
+                <a:prstGeom prst="line">
+                  <a:avLst/>
+                </a:prstGeom>
+                <a:solidFill>
+                  <a:schemeClr val="accent1"/>
+                </a:solidFill>
+                <a:ln w="44450" cap="flat" cmpd="sng" algn="ctr">
+                  <a:solidFill>
+                    <a:schemeClr val="tx1"/>
+                  </a:solidFill>
+                  <a:prstDash val="solid"/>
+                  <a:round/>
+                  <a:headEnd type="none" w="sm" len="sm"/>
+                  <a:tailEnd type="none" w="sm" len="sm"/>
+                </a:ln>
+                <a:effectLst/>
+              </p:spPr>
+            </p:cxnSp>
+            <p:cxnSp>
+              <p:nvCxnSpPr>
+                <p:cNvPr id="124" name="Straight Connector 123">
+                  <a:extLst>
+                    <a:ext uri="{FF2B5EF4-FFF2-40B4-BE49-F238E27FC236}">
+                      <a16:creationId xmlns:a16="http://schemas.microsoft.com/office/drawing/2014/main" id="{D6C68701-CB8E-B961-36CE-3BEC6F338D11}"/>
+                    </a:ext>
+                  </a:extLst>
+                </p:cNvPr>
+                <p:cNvCxnSpPr>
+                  <a:cxnSpLocks/>
+                </p:cNvCxnSpPr>
+                <p:nvPr/>
+              </p:nvCxnSpPr>
+              <p:spPr bwMode="auto">
+                <a:xfrm>
+                  <a:off x="5796666" y="5093763"/>
+                  <a:ext cx="951931" cy="0"/>
+                </a:xfrm>
+                <a:prstGeom prst="line">
+                  <a:avLst/>
+                </a:prstGeom>
+                <a:solidFill>
+                  <a:schemeClr val="accent1"/>
+                </a:solidFill>
+                <a:ln w="12700" cap="flat" cmpd="sng" algn="ctr">
+                  <a:solidFill>
+                    <a:schemeClr val="tx1"/>
+                  </a:solidFill>
+                  <a:prstDash val="solid"/>
+                  <a:round/>
+                  <a:headEnd type="none" w="sm" len="sm"/>
+                  <a:tailEnd type="none" w="sm" len="sm"/>
+                </a:ln>
+                <a:effectLst/>
+              </p:spPr>
+            </p:cxnSp>
+            <p:cxnSp>
+              <p:nvCxnSpPr>
+                <p:cNvPr id="125" name="Straight Connector 124">
+                  <a:extLst>
+                    <a:ext uri="{FF2B5EF4-FFF2-40B4-BE49-F238E27FC236}">
+                      <a16:creationId xmlns:a16="http://schemas.microsoft.com/office/drawing/2014/main" id="{56623841-1DB4-F7B2-FA78-8180E5DC73C9}"/>
+                    </a:ext>
+                  </a:extLst>
+                </p:cNvPr>
+                <p:cNvCxnSpPr>
+                  <a:cxnSpLocks/>
+                </p:cNvCxnSpPr>
+                <p:nvPr/>
+              </p:nvCxnSpPr>
+              <p:spPr bwMode="auto">
+                <a:xfrm flipH="1">
+                  <a:off x="7201466" y="3739003"/>
+                  <a:ext cx="312075" cy="1350560"/>
+                </a:xfrm>
+                <a:prstGeom prst="line">
+                  <a:avLst/>
+                </a:prstGeom>
+                <a:solidFill>
+                  <a:schemeClr val="accent1"/>
+                </a:solidFill>
+                <a:ln w="44450" cap="flat" cmpd="sng" algn="ctr">
+                  <a:solidFill>
+                    <a:schemeClr val="tx1"/>
+                  </a:solidFill>
+                  <a:prstDash val="solid"/>
+                  <a:round/>
+                  <a:headEnd type="none" w="sm" len="sm"/>
+                  <a:tailEnd type="none" w="sm" len="sm"/>
+                </a:ln>
+                <a:effectLst/>
+              </p:spPr>
+            </p:cxnSp>
+            <p:cxnSp>
+              <p:nvCxnSpPr>
+                <p:cNvPr id="126" name="Straight Connector 125">
+                  <a:extLst>
+                    <a:ext uri="{FF2B5EF4-FFF2-40B4-BE49-F238E27FC236}">
+                      <a16:creationId xmlns:a16="http://schemas.microsoft.com/office/drawing/2014/main" id="{9EEC9F2B-0BE6-6A3A-BD90-C36F7CCAC8B1}"/>
+                    </a:ext>
+                  </a:extLst>
+                </p:cNvPr>
+                <p:cNvCxnSpPr>
+                  <a:cxnSpLocks/>
+                </p:cNvCxnSpPr>
+                <p:nvPr/>
+              </p:nvCxnSpPr>
+              <p:spPr bwMode="auto">
+                <a:xfrm flipH="1" flipV="1">
+                  <a:off x="6464744" y="3732492"/>
+                  <a:ext cx="804739" cy="3439"/>
+                </a:xfrm>
+                <a:prstGeom prst="line">
+                  <a:avLst/>
+                </a:prstGeom>
+                <a:solidFill>
+                  <a:schemeClr val="accent1"/>
+                </a:solidFill>
+                <a:ln w="12700" cap="flat" cmpd="sng" algn="ctr">
+                  <a:solidFill>
+                    <a:schemeClr val="tx1"/>
+                  </a:solidFill>
+                  <a:prstDash val="solid"/>
+                  <a:round/>
+                  <a:headEnd type="none" w="sm" len="sm"/>
+                  <a:tailEnd type="none" w="sm" len="sm"/>
+                </a:ln>
+                <a:effectLst/>
+              </p:spPr>
+            </p:cxnSp>
+            <p:cxnSp>
+              <p:nvCxnSpPr>
+                <p:cNvPr id="127" name="Straight Connector 126">
+                  <a:extLst>
+                    <a:ext uri="{FF2B5EF4-FFF2-40B4-BE49-F238E27FC236}">
+                      <a16:creationId xmlns:a16="http://schemas.microsoft.com/office/drawing/2014/main" id="{BFFC4C5F-CBC9-DFA4-EE2C-BA78F7721B31}"/>
+                    </a:ext>
+                  </a:extLst>
+                </p:cNvPr>
+                <p:cNvCxnSpPr>
+                  <a:cxnSpLocks/>
+                </p:cNvCxnSpPr>
+                <p:nvPr/>
+              </p:nvCxnSpPr>
+              <p:spPr bwMode="auto">
+                <a:xfrm>
+                  <a:off x="4582640" y="4119452"/>
+                  <a:ext cx="733963" cy="963630"/>
+                </a:xfrm>
+                <a:prstGeom prst="line">
+                  <a:avLst/>
+                </a:prstGeom>
+                <a:solidFill>
+                  <a:schemeClr val="accent1"/>
+                </a:solidFill>
+                <a:ln w="44450" cap="flat" cmpd="sng" algn="ctr">
+                  <a:solidFill>
+                    <a:schemeClr val="tx1"/>
+                  </a:solidFill>
+                  <a:prstDash val="solid"/>
+                  <a:round/>
+                  <a:headEnd type="none" w="sm" len="sm"/>
+                  <a:tailEnd type="none" w="sm" len="sm"/>
+                </a:ln>
+                <a:effectLst/>
+              </p:spPr>
+            </p:cxnSp>
+            <p:cxnSp>
+              <p:nvCxnSpPr>
+                <p:cNvPr id="128" name="Straight Connector 127">
+                  <a:extLst>
+                    <a:ext uri="{FF2B5EF4-FFF2-40B4-BE49-F238E27FC236}">
+                      <a16:creationId xmlns:a16="http://schemas.microsoft.com/office/drawing/2014/main" id="{1388014E-4BAD-0FE2-794A-38731528BB65}"/>
+                    </a:ext>
+                  </a:extLst>
+                </p:cNvPr>
+                <p:cNvCxnSpPr>
+                  <a:cxnSpLocks/>
+                </p:cNvCxnSpPr>
+                <p:nvPr/>
+              </p:nvCxnSpPr>
+              <p:spPr bwMode="auto">
+                <a:xfrm>
+                  <a:off x="6179657" y="3739595"/>
+                  <a:ext cx="781899" cy="1379136"/>
+                </a:xfrm>
+                <a:prstGeom prst="line">
+                  <a:avLst/>
+                </a:prstGeom>
+                <a:solidFill>
+                  <a:schemeClr val="accent1"/>
+                </a:solidFill>
+                <a:ln w="12700" cap="flat" cmpd="sng" algn="ctr">
+                  <a:solidFill>
+                    <a:schemeClr val="tx1"/>
+                  </a:solidFill>
+                  <a:prstDash val="solid"/>
+                  <a:round/>
+                  <a:headEnd type="none" w="sm" len="sm"/>
+                  <a:tailEnd type="none" w="sm" len="sm"/>
+                </a:ln>
+                <a:effectLst/>
+              </p:spPr>
+            </p:cxnSp>
+            <p:cxnSp>
+              <p:nvCxnSpPr>
+                <p:cNvPr id="142" name="Straight Connector 141">
+                  <a:extLst>
+                    <a:ext uri="{FF2B5EF4-FFF2-40B4-BE49-F238E27FC236}">
+                      <a16:creationId xmlns:a16="http://schemas.microsoft.com/office/drawing/2014/main" id="{EC87EC1F-07FD-F234-3233-CEDAA00F6AC6}"/>
+                    </a:ext>
+                  </a:extLst>
+                </p:cNvPr>
+                <p:cNvCxnSpPr>
+                  <a:cxnSpLocks/>
+                </p:cNvCxnSpPr>
+                <p:nvPr/>
+              </p:nvCxnSpPr>
+              <p:spPr bwMode="auto">
+                <a:xfrm flipH="1">
+                  <a:off x="5541087" y="3749036"/>
+                  <a:ext cx="408194" cy="1324748"/>
+                </a:xfrm>
+                <a:prstGeom prst="line">
+                  <a:avLst/>
+                </a:prstGeom>
+                <a:solidFill>
+                  <a:schemeClr val="accent1"/>
+                </a:solidFill>
+                <a:ln w="44450" cap="flat" cmpd="sng" algn="ctr">
+                  <a:solidFill>
+                    <a:schemeClr val="tx1"/>
+                  </a:solidFill>
+                  <a:prstDash val="solid"/>
+                  <a:round/>
+                  <a:headEnd type="none" w="sm" len="sm"/>
+                  <a:tailEnd type="none" w="sm" len="sm"/>
+                </a:ln>
+                <a:effectLst/>
+              </p:spPr>
+            </p:cxnSp>
+            <p:sp>
+              <p:nvSpPr>
+                <p:cNvPr id="146" name="TextBox 145">
+                  <a:extLst>
+                    <a:ext uri="{FF2B5EF4-FFF2-40B4-BE49-F238E27FC236}">
+                      <a16:creationId xmlns:a16="http://schemas.microsoft.com/office/drawing/2014/main" id="{62FB1187-9644-2460-0731-F6BC0C1381B0}"/>
+                    </a:ext>
+                  </a:extLst>
+                </p:cNvPr>
+                <p:cNvSpPr txBox="1"/>
+                <p:nvPr/>
+              </p:nvSpPr>
+              <p:spPr>
+                <a:xfrm>
+                  <a:off x="4328872" y="3728200"/>
+                  <a:ext cx="224420" cy="246221"/>
+                </a:xfrm>
+                <a:prstGeom prst="rect">
+                  <a:avLst/>
+                </a:prstGeom>
+                <a:solidFill>
+                  <a:srgbClr val="FFFFE0"/>
+                </a:solidFill>
+              </p:spPr>
+              <p:txBody>
+                <a:bodyPr wrap="none" lIns="0" tIns="0" rIns="0" bIns="0" rtlCol="0" anchor="ctr" anchorCtr="1">
+                  <a:spAutoFit/>
+                </a:bodyPr>
+                <a:lstStyle/>
+                <a:p>
+                  <a:r>
+                    <a:rPr lang="en-US" i="1" dirty="0">
+                      <a:latin typeface="+mn-lt"/>
+                    </a:rPr>
+                    <a:t>C</a:t>
+                  </a:r>
+                  <a:r>
+                    <a:rPr lang="en-US" i="1" baseline="-25000" dirty="0">
+                      <a:latin typeface="+mn-lt"/>
+                    </a:rPr>
+                    <a:t>a</a:t>
+                  </a:r>
+                </a:p>
+              </p:txBody>
+            </p:sp>
+            <p:sp>
+              <p:nvSpPr>
+                <p:cNvPr id="147" name="TextBox 146">
+                  <a:extLst>
+                    <a:ext uri="{FF2B5EF4-FFF2-40B4-BE49-F238E27FC236}">
+                      <a16:creationId xmlns:a16="http://schemas.microsoft.com/office/drawing/2014/main" id="{29657BD4-B12A-5549-2CD0-99B2DBA44255}"/>
+                    </a:ext>
+                  </a:extLst>
+                </p:cNvPr>
+                <p:cNvSpPr txBox="1"/>
+                <p:nvPr/>
+              </p:nvSpPr>
+              <p:spPr>
+                <a:xfrm>
+                  <a:off x="8630573" y="4858341"/>
+                  <a:ext cx="190758" cy="246221"/>
+                </a:xfrm>
+                <a:prstGeom prst="rect">
+                  <a:avLst/>
+                </a:prstGeom>
+                <a:solidFill>
+                  <a:srgbClr val="FFFFE0"/>
+                </a:solidFill>
+              </p:spPr>
+              <p:txBody>
+                <a:bodyPr wrap="none" lIns="0" tIns="0" rIns="0" bIns="0" rtlCol="0" anchor="ctr" anchorCtr="1">
+                  <a:spAutoFit/>
+                </a:bodyPr>
+                <a:lstStyle/>
+                <a:p>
+                  <a:r>
+                    <a:rPr lang="en-US" i="1" dirty="0">
+                      <a:latin typeface="+mn-lt"/>
+                    </a:rPr>
+                    <a:t>C</a:t>
+                  </a:r>
+                  <a:r>
+                    <a:rPr lang="en-US" i="1" baseline="-25000" dirty="0">
+                      <a:latin typeface="+mn-lt"/>
+                    </a:rPr>
+                    <a:t>f</a:t>
+                  </a:r>
+                </a:p>
+              </p:txBody>
+            </p:sp>
+            <p:sp>
+              <p:nvSpPr>
+                <p:cNvPr id="148" name="TextBox 147">
+                  <a:extLst>
+                    <a:ext uri="{FF2B5EF4-FFF2-40B4-BE49-F238E27FC236}">
+                      <a16:creationId xmlns:a16="http://schemas.microsoft.com/office/drawing/2014/main" id="{9BDDF454-62E7-2A38-E010-900B788EFE7A}"/>
+                    </a:ext>
+                  </a:extLst>
+                </p:cNvPr>
+                <p:cNvSpPr txBox="1"/>
+                <p:nvPr/>
+              </p:nvSpPr>
+              <p:spPr>
+                <a:xfrm>
+                  <a:off x="7409248" y="3032664"/>
+                  <a:ext cx="224420" cy="246221"/>
+                </a:xfrm>
+                <a:prstGeom prst="rect">
+                  <a:avLst/>
+                </a:prstGeom>
+                <a:solidFill>
+                  <a:srgbClr val="FFFFE0"/>
+                </a:solidFill>
+              </p:spPr>
+              <p:txBody>
+                <a:bodyPr wrap="none" lIns="0" tIns="0" rIns="0" bIns="0" rtlCol="0" anchor="ctr" anchorCtr="1">
+                  <a:spAutoFit/>
+                </a:bodyPr>
+                <a:lstStyle/>
+                <a:p>
+                  <a:r>
+                    <a:rPr lang="en-US" i="1" dirty="0">
+                      <a:latin typeface="+mn-lt"/>
+                    </a:rPr>
+                    <a:t>C</a:t>
+                  </a:r>
+                  <a:r>
+                    <a:rPr lang="en-US" i="1" baseline="-25000" dirty="0">
+                      <a:latin typeface="+mn-lt"/>
+                    </a:rPr>
+                    <a:t>e</a:t>
+                  </a:r>
+                </a:p>
+              </p:txBody>
+            </p:sp>
+            <p:sp>
+              <p:nvSpPr>
+                <p:cNvPr id="149" name="TextBox 148">
+                  <a:extLst>
+                    <a:ext uri="{FF2B5EF4-FFF2-40B4-BE49-F238E27FC236}">
+                      <a16:creationId xmlns:a16="http://schemas.microsoft.com/office/drawing/2014/main" id="{C793773D-BCE5-1E6C-0B88-9646424F3701}"/>
+                    </a:ext>
+                  </a:extLst>
+                </p:cNvPr>
+                <p:cNvSpPr txBox="1"/>
+                <p:nvPr/>
+              </p:nvSpPr>
+              <p:spPr>
+                <a:xfrm>
+                  <a:off x="6978279" y="5515012"/>
+                  <a:ext cx="227626" cy="246221"/>
+                </a:xfrm>
+                <a:prstGeom prst="rect">
+                  <a:avLst/>
+                </a:prstGeom>
+                <a:solidFill>
+                  <a:srgbClr val="FFFFE0"/>
+                </a:solidFill>
+              </p:spPr>
+              <p:txBody>
+                <a:bodyPr wrap="none" lIns="0" tIns="0" rIns="0" bIns="0" rtlCol="0" anchor="ctr" anchorCtr="1">
+                  <a:spAutoFit/>
+                </a:bodyPr>
+                <a:lstStyle/>
+                <a:p>
+                  <a:r>
+                    <a:rPr lang="en-US" i="1" dirty="0">
+                      <a:latin typeface="+mn-lt"/>
+                    </a:rPr>
+                    <a:t>C</a:t>
+                  </a:r>
+                  <a:r>
+                    <a:rPr lang="en-US" i="1" baseline="-25000" dirty="0">
+                      <a:latin typeface="+mn-lt"/>
+                    </a:rPr>
+                    <a:t>d</a:t>
+                  </a:r>
+                </a:p>
+              </p:txBody>
+            </p:sp>
+            <p:sp>
+              <p:nvSpPr>
+                <p:cNvPr id="150" name="TextBox 149">
+                  <a:extLst>
+                    <a:ext uri="{FF2B5EF4-FFF2-40B4-BE49-F238E27FC236}">
+                      <a16:creationId xmlns:a16="http://schemas.microsoft.com/office/drawing/2014/main" id="{5AB3638A-3A9E-7086-616B-2C5E6F6AF1A8}"/>
+                    </a:ext>
+                  </a:extLst>
+                </p:cNvPr>
+                <p:cNvSpPr txBox="1"/>
+                <p:nvPr/>
+              </p:nvSpPr>
+              <p:spPr>
+                <a:xfrm>
+                  <a:off x="5469774" y="5504160"/>
+                  <a:ext cx="213200" cy="246221"/>
+                </a:xfrm>
+                <a:prstGeom prst="rect">
+                  <a:avLst/>
+                </a:prstGeom>
+                <a:solidFill>
+                  <a:srgbClr val="FFFFE0"/>
+                </a:solidFill>
+              </p:spPr>
+              <p:txBody>
+                <a:bodyPr wrap="none" lIns="0" tIns="0" rIns="0" bIns="0" rtlCol="0" anchor="ctr" anchorCtr="1">
+                  <a:spAutoFit/>
+                </a:bodyPr>
+                <a:lstStyle/>
+                <a:p>
+                  <a:r>
+                    <a:rPr lang="en-US" i="1" dirty="0">
+                      <a:latin typeface="+mn-lt"/>
+                    </a:rPr>
+                    <a:t>C</a:t>
+                  </a:r>
+                  <a:r>
+                    <a:rPr lang="en-US" i="1" baseline="-25000" dirty="0">
+                      <a:latin typeface="+mn-lt"/>
+                    </a:rPr>
+                    <a:t>c</a:t>
+                  </a:r>
+                </a:p>
+              </p:txBody>
+            </p:sp>
+            <p:sp>
+              <p:nvSpPr>
+                <p:cNvPr id="151" name="TextBox 150">
+                  <a:extLst>
+                    <a:ext uri="{FF2B5EF4-FFF2-40B4-BE49-F238E27FC236}">
+                      <a16:creationId xmlns:a16="http://schemas.microsoft.com/office/drawing/2014/main" id="{8463D120-D50C-FA78-BFB7-C9F20B1F9DA1}"/>
+                    </a:ext>
+                  </a:extLst>
+                </p:cNvPr>
+                <p:cNvSpPr txBox="1"/>
+                <p:nvPr/>
+              </p:nvSpPr>
+              <p:spPr>
+                <a:xfrm>
+                  <a:off x="5914139" y="3043126"/>
+                  <a:ext cx="227626" cy="246221"/>
+                </a:xfrm>
+                <a:prstGeom prst="rect">
+                  <a:avLst/>
+                </a:prstGeom>
+                <a:solidFill>
+                  <a:srgbClr val="FFFFE0"/>
+                </a:solidFill>
+              </p:spPr>
+              <p:txBody>
+                <a:bodyPr wrap="none" lIns="0" tIns="0" rIns="0" bIns="0" rtlCol="0" anchor="ctr" anchorCtr="1">
+                  <a:spAutoFit/>
+                </a:bodyPr>
+                <a:lstStyle/>
+                <a:p>
+                  <a:r>
+                    <a:rPr lang="en-US" i="1" dirty="0" err="1">
+                      <a:latin typeface="+mn-lt"/>
+                    </a:rPr>
+                    <a:t>C</a:t>
+                  </a:r>
+                  <a:r>
+                    <a:rPr lang="en-US" i="1" baseline="-25000" dirty="0" err="1">
+                      <a:latin typeface="+mn-lt"/>
+                    </a:rPr>
+                    <a:t>b</a:t>
+                  </a:r>
+                  <a:endParaRPr lang="en-US" i="1" baseline="-25000" dirty="0">
+                    <a:latin typeface="+mn-lt"/>
+                  </a:endParaRPr>
+                </a:p>
+              </p:txBody>
+            </p:sp>
+          </p:grpSp>
+        </p:grpSp>
+        <p:cxnSp>
+          <p:nvCxnSpPr>
+            <p:cNvPr id="164" name="Straight Connector 163">
+              <a:extLst>
+                <a:ext uri="{FF2B5EF4-FFF2-40B4-BE49-F238E27FC236}">
+                  <a16:creationId xmlns:a16="http://schemas.microsoft.com/office/drawing/2014/main" id="{06555C57-7CAD-E6DA-3412-A2F5CAF6FB6E}"/>
+                </a:ext>
+              </a:extLst>
+            </p:cNvPr>
+            <p:cNvCxnSpPr>
+              <a:cxnSpLocks/>
+            </p:cNvCxnSpPr>
+            <p:nvPr/>
+          </p:nvCxnSpPr>
+          <p:spPr bwMode="auto">
+            <a:xfrm flipV="1">
+              <a:off x="5565094" y="5089706"/>
+              <a:ext cx="218850" cy="341450"/>
+            </a:xfrm>
+            <a:prstGeom prst="line">
+              <a:avLst/>
+            </a:prstGeom>
+            <a:solidFill>
+              <a:schemeClr val="accent1"/>
+            </a:solidFill>
+            <a:ln w="44450" cap="flat" cmpd="sng" algn="ctr">
+              <a:solidFill>
+                <a:schemeClr val="tx1"/>
+              </a:solidFill>
+              <a:prstDash val="solid"/>
+              <a:round/>
+              <a:headEnd type="none" w="lg" len="lg"/>
+              <a:tailEnd type="none" w="lg" len="lg"/>
+            </a:ln>
+            <a:effectLst/>
+          </p:spPr>
+        </p:cxnSp>
+        <p:cxnSp>
+          <p:nvCxnSpPr>
+            <p:cNvPr id="171" name="Straight Connector 170">
+              <a:extLst>
+                <a:ext uri="{FF2B5EF4-FFF2-40B4-BE49-F238E27FC236}">
+                  <a16:creationId xmlns:a16="http://schemas.microsoft.com/office/drawing/2014/main" id="{864BA4F1-2083-8D7E-972A-8A35A06AA1CD}"/>
+                </a:ext>
+              </a:extLst>
+            </p:cNvPr>
+            <p:cNvCxnSpPr>
+              <a:cxnSpLocks/>
+            </p:cNvCxnSpPr>
+            <p:nvPr/>
+          </p:nvCxnSpPr>
+          <p:spPr bwMode="auto">
+            <a:xfrm flipV="1">
+              <a:off x="7290544" y="3396313"/>
+              <a:ext cx="218850" cy="341450"/>
+            </a:xfrm>
+            <a:prstGeom prst="line">
+              <a:avLst/>
+            </a:prstGeom>
+            <a:solidFill>
+              <a:schemeClr val="accent1"/>
+            </a:solidFill>
+            <a:ln w="44450" cap="flat" cmpd="sng" algn="ctr">
+              <a:solidFill>
+                <a:schemeClr val="tx1"/>
+              </a:solidFill>
+              <a:prstDash val="solid"/>
+              <a:round/>
+              <a:headEnd type="none" w="lg" len="lg"/>
+              <a:tailEnd type="none" w="lg" len="lg"/>
+            </a:ln>
+            <a:effectLst/>
+          </p:spPr>
+        </p:cxnSp>
+        <p:cxnSp>
+          <p:nvCxnSpPr>
+            <p:cNvPr id="172" name="Straight Connector 171">
+              <a:extLst>
+                <a:ext uri="{FF2B5EF4-FFF2-40B4-BE49-F238E27FC236}">
+                  <a16:creationId xmlns:a16="http://schemas.microsoft.com/office/drawing/2014/main" id="{4A85EA39-29C9-BDCF-3CCF-FE17DD257BCC}"/>
+                </a:ext>
+              </a:extLst>
+            </p:cNvPr>
+            <p:cNvCxnSpPr>
+              <a:cxnSpLocks/>
+            </p:cNvCxnSpPr>
+            <p:nvPr/>
+          </p:nvCxnSpPr>
+          <p:spPr bwMode="auto">
+            <a:xfrm flipH="1" flipV="1">
+              <a:off x="5897973" y="3391521"/>
+              <a:ext cx="281684" cy="347482"/>
+            </a:xfrm>
+            <a:prstGeom prst="line">
+              <a:avLst/>
+            </a:prstGeom>
+            <a:solidFill>
+              <a:schemeClr val="accent1"/>
+            </a:solidFill>
+            <a:ln w="44450" cap="flat" cmpd="sng" algn="ctr">
+              <a:solidFill>
+                <a:schemeClr val="tx1"/>
+              </a:solidFill>
+              <a:prstDash val="solid"/>
+              <a:round/>
+              <a:headEnd type="none" w="lg" len="lg"/>
+              <a:tailEnd type="none" w="lg" len="lg"/>
+            </a:ln>
+            <a:effectLst/>
+          </p:spPr>
+        </p:cxnSp>
+        <p:cxnSp>
+          <p:nvCxnSpPr>
+            <p:cNvPr id="173" name="Straight Connector 172">
+              <a:extLst>
+                <a:ext uri="{FF2B5EF4-FFF2-40B4-BE49-F238E27FC236}">
+                  <a16:creationId xmlns:a16="http://schemas.microsoft.com/office/drawing/2014/main" id="{380BAE5C-5DDF-72F6-95A8-4532C92C4D31}"/>
+                </a:ext>
+              </a:extLst>
+            </p:cNvPr>
+            <p:cNvCxnSpPr>
+              <a:cxnSpLocks/>
+            </p:cNvCxnSpPr>
+            <p:nvPr/>
+          </p:nvCxnSpPr>
+          <p:spPr bwMode="auto">
+            <a:xfrm flipH="1" flipV="1">
+              <a:off x="6200161" y="3385040"/>
+              <a:ext cx="239435" cy="353963"/>
+            </a:xfrm>
+            <a:prstGeom prst="line">
+              <a:avLst/>
+            </a:prstGeom>
+            <a:solidFill>
+              <a:schemeClr val="accent1"/>
+            </a:solidFill>
+            <a:ln w="44450" cap="flat" cmpd="sng" algn="ctr">
+              <a:solidFill>
+                <a:schemeClr val="tx1"/>
+              </a:solidFill>
+              <a:prstDash val="solid"/>
+              <a:round/>
+              <a:headEnd type="none" w="lg" len="lg"/>
+              <a:tailEnd type="none" w="lg" len="lg"/>
+            </a:ln>
+            <a:effectLst/>
+          </p:spPr>
+        </p:cxnSp>
+        <p:cxnSp>
+          <p:nvCxnSpPr>
+            <p:cNvPr id="174" name="Straight Connector 173">
+              <a:extLst>
+                <a:ext uri="{FF2B5EF4-FFF2-40B4-BE49-F238E27FC236}">
+                  <a16:creationId xmlns:a16="http://schemas.microsoft.com/office/drawing/2014/main" id="{739550B5-AB31-E224-CCFF-1297F3F723DF}"/>
+                </a:ext>
+              </a:extLst>
+            </p:cNvPr>
+            <p:cNvCxnSpPr>
+              <a:cxnSpLocks/>
+            </p:cNvCxnSpPr>
+            <p:nvPr/>
+          </p:nvCxnSpPr>
+          <p:spPr bwMode="auto">
+            <a:xfrm flipH="1" flipV="1">
+              <a:off x="6732813" y="5087874"/>
+              <a:ext cx="171302" cy="370031"/>
+            </a:xfrm>
+            <a:prstGeom prst="line">
+              <a:avLst/>
+            </a:prstGeom>
+            <a:solidFill>
+              <a:schemeClr val="accent1"/>
+            </a:solidFill>
+            <a:ln w="44450" cap="flat" cmpd="sng" algn="ctr">
+              <a:solidFill>
+                <a:schemeClr val="tx1"/>
+              </a:solidFill>
+              <a:prstDash val="solid"/>
+              <a:round/>
+              <a:headEnd type="none" w="lg" len="lg"/>
+              <a:tailEnd type="none" w="lg" len="lg"/>
+            </a:ln>
+            <a:effectLst/>
+          </p:spPr>
+        </p:cxnSp>
+        <p:cxnSp>
+          <p:nvCxnSpPr>
+            <p:cNvPr id="175" name="Straight Connector 174">
+              <a:extLst>
+                <a:ext uri="{FF2B5EF4-FFF2-40B4-BE49-F238E27FC236}">
+                  <a16:creationId xmlns:a16="http://schemas.microsoft.com/office/drawing/2014/main" id="{A16D2F68-7CA2-6EB2-B39E-C642F0B7425E}"/>
+                </a:ext>
+              </a:extLst>
+            </p:cNvPr>
+            <p:cNvCxnSpPr>
+              <a:cxnSpLocks/>
+            </p:cNvCxnSpPr>
+            <p:nvPr/>
+          </p:nvCxnSpPr>
+          <p:spPr bwMode="auto">
+            <a:xfrm flipH="1" flipV="1">
+              <a:off x="6953405" y="5099004"/>
+              <a:ext cx="236644" cy="341593"/>
+            </a:xfrm>
+            <a:prstGeom prst="line">
+              <a:avLst/>
+            </a:prstGeom>
+            <a:solidFill>
+              <a:schemeClr val="accent1"/>
+            </a:solidFill>
+            <a:ln w="44450" cap="flat" cmpd="sng" algn="ctr">
+              <a:solidFill>
+                <a:schemeClr val="tx1"/>
+              </a:solidFill>
+              <a:prstDash val="solid"/>
+              <a:round/>
+              <a:headEnd type="none" w="lg" len="lg"/>
+              <a:tailEnd type="none" w="lg" len="lg"/>
+            </a:ln>
+            <a:effectLst/>
+          </p:spPr>
+        </p:cxnSp>
+      </p:grpSp>
+    </p:spTree>
+    <p:extLst>
+      <p:ext uri="{BB962C8B-B14F-4D97-AF65-F5344CB8AC3E}">
+        <p14:creationId xmlns:p14="http://schemas.microsoft.com/office/powerpoint/2010/main" val="1155188459"/>
+      </p:ext>
+    </p:extLst>
+  </p:cSld>
+  <p:clrMapOvr>
+    <a:masterClrMapping/>
+  </p:clrMapOvr>
 </p:sld>
 </file>
 

</xml_diff>